<commit_message>
- update presentation - update readme
</commit_message>
<xml_diff>
--- a/GitHub Einführung.pptx
+++ b/GitHub Einführung.pptx
@@ -6,10 +6,10 @@
     <p:sldMasterId id="2147483756" r:id="rId5"/>
   </p:sldMasterIdLst>
   <p:notesMasterIdLst>
-    <p:notesMasterId r:id="rId20"/>
+    <p:notesMasterId r:id="rId21"/>
   </p:notesMasterIdLst>
   <p:handoutMasterIdLst>
-    <p:handoutMasterId r:id="rId21"/>
+    <p:handoutMasterId r:id="rId22"/>
   </p:handoutMasterIdLst>
   <p:sldIdLst>
     <p:sldId id="385" r:id="rId6"/>
@@ -25,7 +25,8 @@
     <p:sldId id="407" r:id="rId16"/>
     <p:sldId id="405" r:id="rId17"/>
     <p:sldId id="404" r:id="rId18"/>
-    <p:sldId id="387" r:id="rId19"/>
+    <p:sldId id="408" r:id="rId19"/>
+    <p:sldId id="387" r:id="rId20"/>
   </p:sldIdLst>
   <p:sldSz cx="12188825" cy="6858000"/>
   <p:notesSz cx="6858000" cy="9144000"/>
@@ -142,6 +143,7 @@
             <p14:sldId id="407"/>
             <p14:sldId id="405"/>
             <p14:sldId id="404"/>
+            <p14:sldId id="408"/>
             <p14:sldId id="387"/>
           </p14:sldIdLst>
         </p14:section>
@@ -1363,6 +1365,91 @@
 </p:notes>
 </file>
 
+<file path=ppt/notesSlides/notesSlide14.xml><?xml version="1.0" encoding="utf-8"?>
+<p:notes xmlns:a="http://schemas.openxmlformats.org/drawingml/2006/main" xmlns:r="http://schemas.openxmlformats.org/officeDocument/2006/relationships" xmlns:p="http://schemas.openxmlformats.org/presentationml/2006/main">
+  <p:cSld>
+    <p:spTree>
+      <p:nvGrpSpPr>
+        <p:cNvPr id="1" name=""/>
+        <p:cNvGrpSpPr/>
+        <p:nvPr/>
+      </p:nvGrpSpPr>
+      <p:grpSpPr>
+        <a:xfrm>
+          <a:off x="0" y="0"/>
+          <a:ext cx="0" cy="0"/>
+          <a:chOff x="0" y="0"/>
+          <a:chExt cx="0" cy="0"/>
+        </a:xfrm>
+      </p:grpSpPr>
+      <p:sp>
+        <p:nvSpPr>
+          <p:cNvPr id="2" name="Folienbildplatzhalter 1"/>
+          <p:cNvSpPr>
+            <a:spLocks noGrp="1" noRot="1" noChangeAspect="1"/>
+          </p:cNvSpPr>
+          <p:nvPr>
+            <p:ph type="sldImg"/>
+          </p:nvPr>
+        </p:nvSpPr>
+        <p:spPr/>
+      </p:sp>
+      <p:sp>
+        <p:nvSpPr>
+          <p:cNvPr id="3" name="Notizenplatzhalter 2"/>
+          <p:cNvSpPr>
+            <a:spLocks noGrp="1"/>
+          </p:cNvSpPr>
+          <p:nvPr>
+            <p:ph type="body" idx="1"/>
+          </p:nvPr>
+        </p:nvSpPr>
+        <p:spPr/>
+        <p:txBody>
+          <a:bodyPr/>
+          <a:lstStyle/>
+          <a:p>
+            <a:endParaRPr lang="de-DE" dirty="0"/>
+          </a:p>
+        </p:txBody>
+      </p:sp>
+      <p:sp>
+        <p:nvSpPr>
+          <p:cNvPr id="4" name="Foliennummernplatzhalter 3"/>
+          <p:cNvSpPr>
+            <a:spLocks noGrp="1"/>
+          </p:cNvSpPr>
+          <p:nvPr>
+            <p:ph type="sldNum" sz="quarter" idx="10"/>
+          </p:nvPr>
+        </p:nvSpPr>
+        <p:spPr/>
+        <p:txBody>
+          <a:bodyPr/>
+          <a:lstStyle/>
+          <a:p>
+            <a:fld id="{8B263312-38AA-4E1E-B2B5-0F8F122B24FE}" type="slidenum">
+              <a:rPr lang="en-US" smtClean="0"/>
+              <a:pPr/>
+              <a:t>14</a:t>
+            </a:fld>
+            <a:endParaRPr lang="en-US" dirty="0"/>
+          </a:p>
+        </p:txBody>
+      </p:sp>
+    </p:spTree>
+    <p:extLst>
+      <p:ext uri="{BB962C8B-B14F-4D97-AF65-F5344CB8AC3E}">
+        <p14:creationId xmlns:p14="http://schemas.microsoft.com/office/powerpoint/2010/main" val="1632483366"/>
+      </p:ext>
+    </p:extLst>
+  </p:cSld>
+  <p:clrMapOvr>
+    <a:masterClrMapping/>
+  </p:clrMapOvr>
+</p:notes>
+</file>
+
 <file path=ppt/notesSlides/notesSlide2.xml><?xml version="1.0" encoding="utf-8"?>
 <p:notes xmlns:a="http://schemas.openxmlformats.org/drawingml/2006/main" xmlns:r="http://schemas.openxmlformats.org/officeDocument/2006/relationships" xmlns:p="http://schemas.openxmlformats.org/presentationml/2006/main">
   <p:cSld>
@@ -6241,7 +6328,9 @@
                   <a:srgbClr val="FFFFFF"/>
                 </a:solidFill>
                 <a:effectLst/>
-                <a:latin typeface="inherit"/>
+                <a:latin typeface="Arial" charset="0"/>
+                <a:ea typeface="Arial" charset="0"/>
+                <a:cs typeface="Arial" charset="0"/>
               </a:rPr>
               <a:t> $  </a:t>
             </a:r>
@@ -6254,7 +6343,9 @@
                   <a:srgbClr val="FFFFFF"/>
                 </a:solidFill>
                 <a:effectLst/>
-                <a:latin typeface="inherit"/>
+                <a:latin typeface="Arial" charset="0"/>
+                <a:ea typeface="Arial" charset="0"/>
+                <a:cs typeface="Arial" charset="0"/>
               </a:rPr>
               <a:t>git</a:t>
             </a:r>
@@ -6267,7 +6358,9 @@
                   <a:srgbClr val="FFFFFF"/>
                 </a:solidFill>
                 <a:effectLst/>
-                <a:latin typeface="inherit"/>
+                <a:latin typeface="Arial" charset="0"/>
+                <a:ea typeface="Arial" charset="0"/>
+                <a:cs typeface="Arial" charset="0"/>
               </a:rPr>
               <a:t> push -u [</a:t>
             </a:r>
@@ -6280,7 +6373,9 @@
                   <a:srgbClr val="FFFFFF"/>
                 </a:solidFill>
                 <a:effectLst/>
-                <a:latin typeface="inherit"/>
+                <a:latin typeface="Arial" charset="0"/>
+                <a:ea typeface="Arial" charset="0"/>
+                <a:cs typeface="Arial" charset="0"/>
               </a:rPr>
               <a:t>RemoteShortName</a:t>
             </a:r>
@@ -6293,7 +6388,9 @@
                   <a:srgbClr val="FFFFFF"/>
                 </a:solidFill>
                 <a:effectLst/>
-                <a:latin typeface="inherit"/>
+                <a:latin typeface="Arial" charset="0"/>
+                <a:ea typeface="Arial" charset="0"/>
+                <a:cs typeface="Arial" charset="0"/>
               </a:rPr>
               <a:t>] [</a:t>
             </a:r>
@@ -6306,7 +6403,9 @@
                   <a:srgbClr val="FFFFFF"/>
                 </a:solidFill>
                 <a:effectLst/>
-                <a:latin typeface="inherit"/>
+                <a:latin typeface="Arial" charset="0"/>
+                <a:ea typeface="Arial" charset="0"/>
+                <a:cs typeface="Arial" charset="0"/>
               </a:rPr>
               <a:t>BranchName</a:t>
             </a:r>
@@ -6319,12 +6418,16 @@
                   <a:srgbClr val="FFFFFF"/>
                 </a:solidFill>
                 <a:effectLst/>
-                <a:latin typeface="inherit"/>
+                <a:latin typeface="Arial" charset="0"/>
+                <a:ea typeface="Arial" charset="0"/>
+                <a:cs typeface="Arial" charset="0"/>
               </a:rPr>
               <a:t>]</a:t>
             </a:r>
             <a:endParaRPr lang="de-DE" altLang="de-DE" sz="2800" dirty="0">
-              <a:latin typeface="Arial" panose="020B0604020202020204" pitchFamily="34" charset="0"/>
+              <a:latin typeface="Arial" charset="0"/>
+              <a:ea typeface="Arial" charset="0"/>
+              <a:cs typeface="Arial" charset="0"/>
             </a:endParaRPr>
           </a:p>
           <a:p>
@@ -6349,7 +6452,9 @@
                 <a:solidFill>
                   <a:srgbClr val="FFFFFF"/>
                 </a:solidFill>
-                <a:latin typeface="Arial" panose="020B0604020202020204" pitchFamily="34" charset="0"/>
+                <a:latin typeface="Arial" charset="0"/>
+                <a:ea typeface="Arial" charset="0"/>
+                <a:cs typeface="Arial" charset="0"/>
               </a:rPr>
               <a:t> $  </a:t>
             </a:r>
@@ -6358,7 +6463,9 @@
                 <a:solidFill>
                   <a:srgbClr val="FFFFFF"/>
                 </a:solidFill>
-                <a:latin typeface="Arial" panose="020B0604020202020204" pitchFamily="34" charset="0"/>
+                <a:latin typeface="Arial" charset="0"/>
+                <a:ea typeface="Arial" charset="0"/>
+                <a:cs typeface="Arial" charset="0"/>
               </a:rPr>
               <a:t>git</a:t>
             </a:r>
@@ -6367,7 +6474,9 @@
                 <a:solidFill>
                   <a:srgbClr val="FFFFFF"/>
                 </a:solidFill>
-                <a:latin typeface="Arial" panose="020B0604020202020204" pitchFamily="34" charset="0"/>
+                <a:latin typeface="Arial" charset="0"/>
+                <a:ea typeface="Arial" charset="0"/>
+                <a:cs typeface="Arial" charset="0"/>
               </a:rPr>
               <a:t> push -u </a:t>
             </a:r>
@@ -6376,7 +6485,9 @@
                 <a:solidFill>
                   <a:srgbClr val="FFFFFF"/>
                 </a:solidFill>
-                <a:latin typeface="Arial" panose="020B0604020202020204" pitchFamily="34" charset="0"/>
+                <a:latin typeface="Arial" charset="0"/>
+                <a:ea typeface="Arial" charset="0"/>
+                <a:cs typeface="Arial" charset="0"/>
               </a:rPr>
               <a:t>origin</a:t>
             </a:r>
@@ -6385,7 +6496,9 @@
                 <a:solidFill>
                   <a:srgbClr val="FFFFFF"/>
                 </a:solidFill>
-                <a:latin typeface="Arial" panose="020B0604020202020204" pitchFamily="34" charset="0"/>
+                <a:latin typeface="Arial" charset="0"/>
+                <a:ea typeface="Arial" charset="0"/>
+                <a:cs typeface="Arial" charset="0"/>
               </a:rPr>
               <a:t> </a:t>
             </a:r>
@@ -6394,7 +6507,9 @@
                 <a:solidFill>
                   <a:srgbClr val="FFFFFF"/>
                 </a:solidFill>
-                <a:latin typeface="Arial" panose="020B0604020202020204" pitchFamily="34" charset="0"/>
+                <a:latin typeface="Arial" charset="0"/>
+                <a:ea typeface="Arial" charset="0"/>
+                <a:cs typeface="Arial" charset="0"/>
               </a:rPr>
               <a:t>master</a:t>
             </a:r>
@@ -6406,7 +6521,9 @@
                 <a:srgbClr val="FFFFFF"/>
               </a:solidFill>
               <a:effectLst/>
-              <a:latin typeface="inherit"/>
+              <a:latin typeface="Arial" charset="0"/>
+              <a:ea typeface="Arial" charset="0"/>
+              <a:cs typeface="Arial" charset="0"/>
             </a:endParaRPr>
           </a:p>
         </p:txBody>
@@ -6784,7 +6901,9 @@
                   <a:srgbClr val="FFFFFF"/>
                 </a:solidFill>
                 <a:effectLst/>
-                <a:latin typeface="inherit"/>
+                <a:latin typeface="Arial" charset="0"/>
+                <a:ea typeface="Arial" charset="0"/>
+                <a:cs typeface="Arial" charset="0"/>
               </a:rPr>
               <a:t> $  </a:t>
             </a:r>
@@ -6797,7 +6916,9 @@
                   <a:srgbClr val="FFFFFF"/>
                 </a:solidFill>
                 <a:effectLst/>
-                <a:latin typeface="inherit"/>
+                <a:latin typeface="Arial" charset="0"/>
+                <a:ea typeface="Arial" charset="0"/>
+                <a:cs typeface="Arial" charset="0"/>
               </a:rPr>
               <a:t>git</a:t>
             </a:r>
@@ -6810,7 +6931,9 @@
                   <a:srgbClr val="FFFFFF"/>
                 </a:solidFill>
                 <a:effectLst/>
-                <a:latin typeface="inherit"/>
+                <a:latin typeface="Arial" charset="0"/>
+                <a:ea typeface="Arial" charset="0"/>
+                <a:cs typeface="Arial" charset="0"/>
               </a:rPr>
               <a:t> push</a:t>
             </a:r>
@@ -6823,7 +6946,9 @@
                   <a:srgbClr val="FFFFFF"/>
                 </a:solidFill>
                 <a:effectLst/>
-                <a:latin typeface="inherit"/>
+                <a:latin typeface="Arial" charset="0"/>
+                <a:ea typeface="Arial" charset="0"/>
+                <a:cs typeface="Arial" charset="0"/>
               </a:rPr>
               <a:t> -u</a:t>
             </a:r>
@@ -6835,7 +6960,9 @@
                 <a:schemeClr val="tx1"/>
               </a:solidFill>
               <a:effectLst/>
-              <a:latin typeface="Arial" panose="020B0604020202020204" pitchFamily="34" charset="0"/>
+              <a:latin typeface="Arial" charset="0"/>
+              <a:ea typeface="Arial" charset="0"/>
+              <a:cs typeface="Arial" charset="0"/>
             </a:endParaRPr>
           </a:p>
         </p:txBody>
@@ -7392,7 +7519,9 @@
                 <a:solidFill>
                   <a:srgbClr val="FFFFFF"/>
                 </a:solidFill>
-                <a:latin typeface="inherit"/>
+                <a:latin typeface="Arial" charset="0"/>
+                <a:ea typeface="Arial" charset="0"/>
+                <a:cs typeface="Arial" charset="0"/>
               </a:rPr>
               <a:t> $  </a:t>
             </a:r>
@@ -7401,7 +7530,9 @@
                 <a:solidFill>
                   <a:srgbClr val="FFFFFF"/>
                 </a:solidFill>
-                <a:latin typeface="inherit"/>
+                <a:latin typeface="Arial" charset="0"/>
+                <a:ea typeface="Arial" charset="0"/>
+                <a:cs typeface="Arial" charset="0"/>
               </a:rPr>
               <a:t>git</a:t>
             </a:r>
@@ -7410,7 +7541,9 @@
                 <a:solidFill>
                   <a:srgbClr val="FFFFFF"/>
                 </a:solidFill>
-                <a:latin typeface="inherit"/>
+                <a:latin typeface="Arial" charset="0"/>
+                <a:ea typeface="Arial" charset="0"/>
+                <a:cs typeface="Arial" charset="0"/>
               </a:rPr>
               <a:t> </a:t>
             </a:r>
@@ -7419,7 +7552,9 @@
                 <a:solidFill>
                   <a:srgbClr val="FFFFFF"/>
                 </a:solidFill>
-                <a:latin typeface="inherit"/>
+                <a:latin typeface="Arial" charset="0"/>
+                <a:ea typeface="Arial" charset="0"/>
+                <a:cs typeface="Arial" charset="0"/>
               </a:rPr>
               <a:t>fetch</a:t>
             </a:r>
@@ -7428,7 +7563,9 @@
                 <a:solidFill>
                   <a:srgbClr val="FFFFFF"/>
                 </a:solidFill>
-                <a:latin typeface="inherit"/>
+                <a:latin typeface="Arial" charset="0"/>
+                <a:ea typeface="Arial" charset="0"/>
+                <a:cs typeface="Arial" charset="0"/>
               </a:rPr>
               <a:t> </a:t>
             </a:r>
@@ -7437,7 +7574,9 @@
                 <a:solidFill>
                   <a:srgbClr val="FFFFFF"/>
                 </a:solidFill>
-                <a:latin typeface="inherit"/>
+                <a:latin typeface="Arial" charset="0"/>
+                <a:ea typeface="Arial" charset="0"/>
+                <a:cs typeface="Arial" charset="0"/>
               </a:rPr>
               <a:t>[remote-name]</a:t>
             </a:r>
@@ -7449,7 +7588,9 @@
                 <a:srgbClr val="FFFFFF"/>
               </a:solidFill>
               <a:effectLst/>
-              <a:latin typeface="inherit"/>
+              <a:latin typeface="Arial" charset="0"/>
+              <a:ea typeface="Arial" charset="0"/>
+              <a:cs typeface="Arial" charset="0"/>
             </a:endParaRPr>
           </a:p>
           <a:p>
@@ -7478,7 +7619,9 @@
                   <a:srgbClr val="FFFFFF"/>
                 </a:solidFill>
                 <a:effectLst/>
-                <a:latin typeface="inherit"/>
+                <a:latin typeface="Arial" charset="0"/>
+                <a:ea typeface="Arial" charset="0"/>
+                <a:cs typeface="Arial" charset="0"/>
               </a:rPr>
               <a:t> $  </a:t>
             </a:r>
@@ -7491,7 +7634,9 @@
                   <a:srgbClr val="FFFFFF"/>
                 </a:solidFill>
                 <a:effectLst/>
-                <a:latin typeface="inherit"/>
+                <a:latin typeface="Arial" charset="0"/>
+                <a:ea typeface="Arial" charset="0"/>
+                <a:cs typeface="Arial" charset="0"/>
               </a:rPr>
               <a:t>git</a:t>
             </a:r>
@@ -7504,7 +7649,9 @@
                   <a:srgbClr val="FFFFFF"/>
                 </a:solidFill>
                 <a:effectLst/>
-                <a:latin typeface="inherit"/>
+                <a:latin typeface="Arial" charset="0"/>
+                <a:ea typeface="Arial" charset="0"/>
+                <a:cs typeface="Arial" charset="0"/>
               </a:rPr>
               <a:t> </a:t>
             </a:r>
@@ -7513,7 +7660,9 @@
                 <a:solidFill>
                   <a:srgbClr val="FFFFFF"/>
                 </a:solidFill>
-                <a:latin typeface="inherit"/>
+                <a:latin typeface="Arial" charset="0"/>
+                <a:ea typeface="Arial" charset="0"/>
+                <a:cs typeface="Arial" charset="0"/>
               </a:rPr>
               <a:t>fetch</a:t>
             </a:r>
@@ -7522,7 +7671,9 @@
                 <a:solidFill>
                   <a:srgbClr val="FFFFFF"/>
                 </a:solidFill>
-                <a:latin typeface="inherit"/>
+                <a:latin typeface="Arial" charset="0"/>
+                <a:ea typeface="Arial" charset="0"/>
+                <a:cs typeface="Arial" charset="0"/>
               </a:rPr>
               <a:t> </a:t>
             </a:r>
@@ -7531,7 +7682,9 @@
                 <a:solidFill>
                   <a:srgbClr val="FFFFFF"/>
                 </a:solidFill>
-                <a:latin typeface="inherit"/>
+                <a:latin typeface="Arial" charset="0"/>
+                <a:ea typeface="Arial" charset="0"/>
+                <a:cs typeface="Arial" charset="0"/>
               </a:rPr>
               <a:t>origin</a:t>
             </a:r>
@@ -7543,436 +7696,9 @@
                 <a:srgbClr val="FFFFFF"/>
               </a:solidFill>
               <a:effectLst/>
-              <a:latin typeface="inherit"/>
-            </a:endParaRPr>
-          </a:p>
-        </p:txBody>
-      </p:sp>
-      <p:sp>
-        <p:nvSpPr>
-          <p:cNvPr id="9" name="Text Placeholder 2"/>
-          <p:cNvSpPr txBox="1">
-            <a:spLocks/>
-          </p:cNvSpPr>
-          <p:nvPr/>
-        </p:nvSpPr>
-        <p:spPr>
-          <a:xfrm>
-            <a:off x="519112" y="3689253"/>
-            <a:ext cx="11149013" cy="553998"/>
-          </a:xfrm>
-          <a:prstGeom prst="rect">
-            <a:avLst/>
-          </a:prstGeom>
-        </p:spPr>
-        <p:txBody>
-          <a:bodyPr/>
-          <a:lstStyle>
-            <a:lvl1pPr marL="346075" indent="-346075" algn="l" defTabSz="914363" rtl="0" eaLnBrk="1" latinLnBrk="0" hangingPunct="1">
-              <a:lnSpc>
-                <a:spcPct val="90000"/>
-              </a:lnSpc>
-              <a:spcBef>
-                <a:spcPct val="20000"/>
-              </a:spcBef>
-              <a:buSzPct val="90000"/>
-              <a:buFont typeface="Arial" pitchFamily="34" charset="0"/>
-              <a:buChar char="•"/>
-              <a:defRPr sz="3200" kern="1200">
-                <a:gradFill flip="none" rotWithShape="1">
-                  <a:gsLst>
-                    <a:gs pos="0">
-                      <a:schemeClr val="tx1">
-                        <a:lumMod val="65000"/>
-                        <a:lumOff val="35000"/>
-                      </a:schemeClr>
-                    </a:gs>
-                    <a:gs pos="86000">
-                      <a:schemeClr val="tx1">
-                        <a:lumMod val="75000"/>
-                        <a:lumOff val="25000"/>
-                      </a:schemeClr>
-                    </a:gs>
-                  </a:gsLst>
-                  <a:path path="circle">
-                    <a:fillToRect r="100000" b="100000"/>
-                  </a:path>
-                  <a:tileRect l="-100000" t="-100000"/>
-                </a:gradFill>
-                <a:latin typeface="+mn-lt"/>
-                <a:ea typeface="+mn-ea"/>
-                <a:cs typeface="+mn-cs"/>
-              </a:defRPr>
-            </a:lvl1pPr>
-            <a:lvl2pPr marL="630238" indent="-284163" algn="l" defTabSz="914363" rtl="0" eaLnBrk="1" latinLnBrk="0" hangingPunct="1">
-              <a:lnSpc>
-                <a:spcPct val="90000"/>
-              </a:lnSpc>
-              <a:spcBef>
-                <a:spcPct val="20000"/>
-              </a:spcBef>
-              <a:buSzPct val="90000"/>
-              <a:buFont typeface="Arial" pitchFamily="34" charset="0"/>
-              <a:buChar char="•"/>
-              <a:tabLst>
-                <a:tab pos="630238" algn="l"/>
-              </a:tabLst>
-              <a:defRPr sz="2800" kern="1200">
-                <a:gradFill flip="none" rotWithShape="1">
-                  <a:gsLst>
-                    <a:gs pos="0">
-                      <a:schemeClr val="tx1">
-                        <a:lumMod val="65000"/>
-                        <a:lumOff val="35000"/>
-                      </a:schemeClr>
-                    </a:gs>
-                    <a:gs pos="86000">
-                      <a:schemeClr val="tx1">
-                        <a:lumMod val="75000"/>
-                        <a:lumOff val="25000"/>
-                      </a:schemeClr>
-                    </a:gs>
-                  </a:gsLst>
-                  <a:path path="circle">
-                    <a:fillToRect r="100000" b="100000"/>
-                  </a:path>
-                  <a:tileRect l="-100000" t="-100000"/>
-                </a:gradFill>
-                <a:latin typeface="+mn-lt"/>
-                <a:ea typeface="+mn-ea"/>
-                <a:cs typeface="+mn-cs"/>
-              </a:defRPr>
-            </a:lvl2pPr>
-            <a:lvl3pPr marL="914400" indent="-284163" algn="l" defTabSz="914363" rtl="0" eaLnBrk="1" latinLnBrk="0" hangingPunct="1">
-              <a:lnSpc>
-                <a:spcPct val="90000"/>
-              </a:lnSpc>
-              <a:spcBef>
-                <a:spcPct val="20000"/>
-              </a:spcBef>
-              <a:buSzPct val="90000"/>
-              <a:buFont typeface="Arial" pitchFamily="34" charset="0"/>
-              <a:buChar char="•"/>
-              <a:defRPr sz="2400" kern="1200">
-                <a:gradFill flip="none" rotWithShape="1">
-                  <a:gsLst>
-                    <a:gs pos="0">
-                      <a:schemeClr val="tx1">
-                        <a:lumMod val="65000"/>
-                        <a:lumOff val="35000"/>
-                      </a:schemeClr>
-                    </a:gs>
-                    <a:gs pos="86000">
-                      <a:schemeClr val="tx1">
-                        <a:lumMod val="75000"/>
-                        <a:lumOff val="25000"/>
-                      </a:schemeClr>
-                    </a:gs>
-                  </a:gsLst>
-                  <a:path path="circle">
-                    <a:fillToRect r="100000" b="100000"/>
-                  </a:path>
-                  <a:tileRect l="-100000" t="-100000"/>
-                </a:gradFill>
-                <a:latin typeface="+mn-lt"/>
-                <a:ea typeface="+mn-ea"/>
-                <a:cs typeface="+mn-cs"/>
-              </a:defRPr>
-            </a:lvl3pPr>
-            <a:lvl4pPr marL="1482725" indent="-223838" algn="l" defTabSz="914363" rtl="0" eaLnBrk="1" latinLnBrk="0" hangingPunct="1">
-              <a:lnSpc>
-                <a:spcPct val="90000"/>
-              </a:lnSpc>
-              <a:spcBef>
-                <a:spcPct val="20000"/>
-              </a:spcBef>
-              <a:buSzPct val="90000"/>
-              <a:buFont typeface="Arial" pitchFamily="34" charset="0"/>
-              <a:buChar char="•"/>
-              <a:tabLst>
-                <a:tab pos="914400" algn="l"/>
-              </a:tabLst>
-              <a:defRPr sz="2000" kern="1200">
-                <a:gradFill flip="none" rotWithShape="1">
-                  <a:gsLst>
-                    <a:gs pos="0">
-                      <a:schemeClr val="tx1">
-                        <a:lumMod val="65000"/>
-                        <a:lumOff val="35000"/>
-                      </a:schemeClr>
-                    </a:gs>
-                    <a:gs pos="86000">
-                      <a:schemeClr val="tx1">
-                        <a:lumMod val="75000"/>
-                        <a:lumOff val="25000"/>
-                      </a:schemeClr>
-                    </a:gs>
-                  </a:gsLst>
-                  <a:path path="circle">
-                    <a:fillToRect r="100000" b="100000"/>
-                  </a:path>
-                  <a:tileRect l="-100000" t="-100000"/>
-                </a:gradFill>
-                <a:latin typeface="+mn-lt"/>
-                <a:ea typeface="+mn-ea"/>
-                <a:cs typeface="+mn-cs"/>
-              </a:defRPr>
-            </a:lvl4pPr>
-            <a:lvl5pPr marL="1712913" indent="-230188" algn="l" defTabSz="914363" rtl="0" eaLnBrk="1" latinLnBrk="0" hangingPunct="1">
-              <a:lnSpc>
-                <a:spcPct val="90000"/>
-              </a:lnSpc>
-              <a:spcBef>
-                <a:spcPct val="20000"/>
-              </a:spcBef>
-              <a:buSzPct val="90000"/>
-              <a:buFont typeface="Arial" pitchFamily="34" charset="0"/>
-              <a:buChar char="•"/>
-              <a:defRPr sz="2000" kern="1200">
-                <a:gradFill flip="none" rotWithShape="1">
-                  <a:gsLst>
-                    <a:gs pos="0">
-                      <a:schemeClr val="tx1">
-                        <a:lumMod val="65000"/>
-                        <a:lumOff val="35000"/>
-                      </a:schemeClr>
-                    </a:gs>
-                    <a:gs pos="86000">
-                      <a:schemeClr val="tx1">
-                        <a:lumMod val="75000"/>
-                        <a:lumOff val="25000"/>
-                      </a:schemeClr>
-                    </a:gs>
-                  </a:gsLst>
-                  <a:path path="circle">
-                    <a:fillToRect r="100000" b="100000"/>
-                  </a:path>
-                  <a:tileRect l="-100000" t="-100000"/>
-                </a:gradFill>
-                <a:latin typeface="+mn-lt"/>
-                <a:ea typeface="+mn-ea"/>
-                <a:cs typeface="+mn-cs"/>
-              </a:defRPr>
-            </a:lvl5pPr>
-            <a:lvl6pPr marL="2514499" indent="-228591" algn="l" defTabSz="914363" rtl="0" eaLnBrk="1" latinLnBrk="0" hangingPunct="1">
-              <a:spcBef>
-                <a:spcPct val="20000"/>
-              </a:spcBef>
-              <a:buFont typeface="Arial" pitchFamily="34" charset="0"/>
-              <a:buChar char="•"/>
-              <a:defRPr sz="2000" kern="1200">
-                <a:solidFill>
-                  <a:schemeClr val="tx1"/>
-                </a:solidFill>
-                <a:latin typeface="+mn-lt"/>
-                <a:ea typeface="+mn-ea"/>
-                <a:cs typeface="+mn-cs"/>
-              </a:defRPr>
-            </a:lvl6pPr>
-            <a:lvl7pPr marL="2971681" indent="-228591" algn="l" defTabSz="914363" rtl="0" eaLnBrk="1" latinLnBrk="0" hangingPunct="1">
-              <a:spcBef>
-                <a:spcPct val="20000"/>
-              </a:spcBef>
-              <a:buFont typeface="Arial" pitchFamily="34" charset="0"/>
-              <a:buChar char="•"/>
-              <a:defRPr sz="2000" kern="1200">
-                <a:solidFill>
-                  <a:schemeClr val="tx1"/>
-                </a:solidFill>
-                <a:latin typeface="+mn-lt"/>
-                <a:ea typeface="+mn-ea"/>
-                <a:cs typeface="+mn-cs"/>
-              </a:defRPr>
-            </a:lvl7pPr>
-            <a:lvl8pPr marL="3428863" indent="-228591" algn="l" defTabSz="914363" rtl="0" eaLnBrk="1" latinLnBrk="0" hangingPunct="1">
-              <a:spcBef>
-                <a:spcPct val="20000"/>
-              </a:spcBef>
-              <a:buFont typeface="Arial" pitchFamily="34" charset="0"/>
-              <a:buChar char="•"/>
-              <a:defRPr sz="2000" kern="1200">
-                <a:solidFill>
-                  <a:schemeClr val="tx1"/>
-                </a:solidFill>
-                <a:latin typeface="+mn-lt"/>
-                <a:ea typeface="+mn-ea"/>
-                <a:cs typeface="+mn-cs"/>
-              </a:defRPr>
-            </a:lvl8pPr>
-            <a:lvl9pPr marL="3886045" indent="-228591" algn="l" defTabSz="914363" rtl="0" eaLnBrk="1" latinLnBrk="0" hangingPunct="1">
-              <a:spcBef>
-                <a:spcPct val="20000"/>
-              </a:spcBef>
-              <a:buFont typeface="Arial" pitchFamily="34" charset="0"/>
-              <a:buChar char="•"/>
-              <a:defRPr sz="2000" kern="1200">
-                <a:solidFill>
-                  <a:schemeClr val="tx1"/>
-                </a:solidFill>
-                <a:latin typeface="+mn-lt"/>
-                <a:ea typeface="+mn-ea"/>
-                <a:cs typeface="+mn-cs"/>
-              </a:defRPr>
-            </a:lvl9pPr>
-          </a:lstStyle>
-          <a:p>
-            <a:pPr marL="0" indent="0">
-              <a:buNone/>
-            </a:pPr>
-            <a:r>
-              <a:rPr lang="de-DE" dirty="0">
-                <a:ln w="3175">
-                  <a:noFill/>
-                </a:ln>
-                <a:gradFill>
-                  <a:gsLst>
-                    <a:gs pos="96667">
-                      <a:srgbClr val="FFFFFF"/>
-                    </a:gs>
-                    <a:gs pos="90000">
-                      <a:srgbClr val="FFFFFF"/>
-                    </a:gs>
-                  </a:gsLst>
-                  <a:lin ang="5400000" scaled="0"/>
-                </a:gradFill>
-                <a:cs typeface="Arial" charset="0"/>
-              </a:rPr>
-              <a:t>Push – Kürzer wenn man nur einen Remote hat</a:t>
-            </a:r>
-          </a:p>
-        </p:txBody>
-      </p:sp>
-      <p:sp>
-        <p:nvSpPr>
-          <p:cNvPr id="10" name="Rectangle 1"/>
-          <p:cNvSpPr>
-            <a:spLocks noChangeArrowheads="1"/>
-          </p:cNvSpPr>
-          <p:nvPr/>
-        </p:nvSpPr>
-        <p:spPr bwMode="auto">
-          <a:xfrm>
-            <a:off x="519112" y="4438252"/>
-            <a:ext cx="11090998" cy="699632"/>
-          </a:xfrm>
-          <a:prstGeom prst="rect">
-            <a:avLst/>
-          </a:prstGeom>
-          <a:solidFill>
-            <a:srgbClr val="333333"/>
-          </a:solidFill>
-          <a:ln>
-            <a:noFill/>
-          </a:ln>
-          <a:effectLst/>
-          <a:extLst>
-            <a:ext uri="{91240B29-F687-4F45-9708-019B960494DF}">
-              <a14:hiddenLine xmlns:a14="http://schemas.microsoft.com/office/drawing/2010/main" w="9525">
-                <a:solidFill>
-                  <a:schemeClr val="tx1"/>
-                </a:solidFill>
-                <a:miter lim="800000"/>
-                <a:headEnd/>
-                <a:tailEnd/>
-              </a14:hiddenLine>
-            </a:ext>
-            <a:ext uri="{AF507438-7753-43E0-B8FC-AC1667EBCBE1}">
-              <a14:hiddenEffects xmlns:a14="http://schemas.microsoft.com/office/drawing/2010/main">
-                <a:effectLst>
-                  <a:outerShdw dist="35921" dir="2700000" algn="ctr" rotWithShape="0">
-                    <a:schemeClr val="bg2"/>
-                  </a:outerShdw>
-                </a:effectLst>
-              </a14:hiddenEffects>
-            </a:ext>
-          </a:extLst>
-        </p:spPr>
-        <p:txBody>
-          <a:bodyPr vert="horz" wrap="square" lIns="0" tIns="0" rIns="0" bIns="0" numCol="1" anchor="ctr" anchorCtr="0" compatLnSpc="1">
-            <a:prstTxWarp prst="textNoShape">
-              <a:avLst/>
-            </a:prstTxWarp>
-            <a:noAutofit/>
-          </a:bodyPr>
-          <a:lstStyle/>
-          <a:p>
-            <a:pPr marL="0" marR="0" lvl="0" indent="0" algn="l" defTabSz="914400" rtl="0" eaLnBrk="0" fontAlgn="base" latinLnBrk="0" hangingPunct="0">
-              <a:lnSpc>
-                <a:spcPct val="100000"/>
-              </a:lnSpc>
-              <a:spcBef>
-                <a:spcPct val="0"/>
-              </a:spcBef>
-              <a:spcAft>
-                <a:spcPct val="0"/>
-              </a:spcAft>
-              <a:buClrTx/>
-              <a:buSzTx/>
-              <a:buFontTx/>
-              <a:buNone/>
-              <a:tabLst/>
-            </a:pPr>
-            <a:r>
-              <a:rPr kumimoji="0" lang="de-DE" altLang="de-DE" sz="2800" b="0" i="0" u="none" strike="noStrike" cap="none" normalizeH="0" baseline="0" dirty="0">
-                <a:ln>
-                  <a:noFill/>
-                </a:ln>
-                <a:solidFill>
-                  <a:srgbClr val="FFFFFF"/>
-                </a:solidFill>
-                <a:effectLst/>
-                <a:latin typeface="inherit"/>
-              </a:rPr>
-              <a:t> $  </a:t>
-            </a:r>
-            <a:r>
-              <a:rPr kumimoji="0" lang="de-DE" altLang="de-DE" sz="2800" b="0" i="0" u="none" strike="noStrike" cap="none" normalizeH="0" baseline="0" dirty="0" err="1">
-                <a:ln>
-                  <a:noFill/>
-                </a:ln>
-                <a:solidFill>
-                  <a:srgbClr val="FFFFFF"/>
-                </a:solidFill>
-                <a:effectLst/>
-                <a:latin typeface="inherit"/>
-              </a:rPr>
-              <a:t>git</a:t>
-            </a:r>
-            <a:r>
-              <a:rPr kumimoji="0" lang="de-DE" altLang="de-DE" sz="2800" b="0" i="0" u="none" strike="noStrike" cap="none" normalizeH="0" baseline="0" dirty="0">
-                <a:ln>
-                  <a:noFill/>
-                </a:ln>
-                <a:solidFill>
-                  <a:srgbClr val="FFFFFF"/>
-                </a:solidFill>
-                <a:effectLst/>
-                <a:latin typeface="inherit"/>
-              </a:rPr>
-              <a:t> push</a:t>
-            </a:r>
-            <a:r>
-              <a:rPr kumimoji="0" lang="de-DE" altLang="de-DE" sz="2800" b="0" i="0" u="none" strike="noStrike" cap="none" normalizeH="0" dirty="0">
-                <a:ln>
-                  <a:noFill/>
-                </a:ln>
-                <a:solidFill>
-                  <a:srgbClr val="FFFFFF"/>
-                </a:solidFill>
-                <a:effectLst/>
-                <a:latin typeface="inherit"/>
-              </a:rPr>
-              <a:t> -u</a:t>
-            </a:r>
-            <a:endParaRPr kumimoji="0" lang="de-DE" altLang="de-DE" sz="2800" b="0" i="0" u="none" strike="noStrike" cap="none" normalizeH="0" baseline="0" dirty="0">
-              <a:ln>
-                <a:noFill/>
-              </a:ln>
-              <a:solidFill>
-                <a:schemeClr val="tx1"/>
-              </a:solidFill>
-              <a:effectLst/>
-              <a:latin typeface="Arial" panose="020B0604020202020204" pitchFamily="34" charset="0"/>
+              <a:latin typeface="Arial" charset="0"/>
+              <a:ea typeface="Arial" charset="0"/>
+              <a:cs typeface="Arial" charset="0"/>
             </a:endParaRPr>
           </a:p>
         </p:txBody>
@@ -8472,7 +8198,9 @@
                 <a:solidFill>
                   <a:srgbClr val="FFFFFF"/>
                 </a:solidFill>
-                <a:latin typeface="inherit"/>
+                <a:latin typeface="Arial" charset="0"/>
+                <a:ea typeface="Arial" charset="0"/>
+                <a:cs typeface="Arial" charset="0"/>
               </a:rPr>
               <a:t> $  </a:t>
             </a:r>
@@ -8481,7 +8209,9 @@
                 <a:solidFill>
                   <a:srgbClr val="FFFFFF"/>
                 </a:solidFill>
-                <a:latin typeface="inherit"/>
+                <a:latin typeface="Arial" charset="0"/>
+                <a:ea typeface="Arial" charset="0"/>
+                <a:cs typeface="Arial" charset="0"/>
               </a:rPr>
               <a:t>git</a:t>
             </a:r>
@@ -8494,7 +8224,9 @@
                   <a:srgbClr val="FFFFFF"/>
                 </a:solidFill>
                 <a:effectLst/>
-                <a:latin typeface="inherit"/>
+                <a:latin typeface="Arial" charset="0"/>
+                <a:ea typeface="Arial" charset="0"/>
+                <a:cs typeface="Arial" charset="0"/>
               </a:rPr>
               <a:t> </a:t>
             </a:r>
@@ -8507,7 +8239,9 @@
                   <a:srgbClr val="FFFFFF"/>
                 </a:solidFill>
                 <a:effectLst/>
-                <a:latin typeface="inherit"/>
+                <a:latin typeface="Arial" charset="0"/>
+                <a:ea typeface="Arial" charset="0"/>
+                <a:cs typeface="Arial" charset="0"/>
               </a:rPr>
               <a:t>branch</a:t>
             </a:r>
@@ -8520,7 +8254,9 @@
                   <a:srgbClr val="FFFFFF"/>
                 </a:solidFill>
                 <a:effectLst/>
-                <a:latin typeface="inherit"/>
+                <a:latin typeface="Arial" charset="0"/>
+                <a:ea typeface="Arial" charset="0"/>
+                <a:cs typeface="Arial" charset="0"/>
               </a:rPr>
               <a:t> -v -a</a:t>
             </a:r>
@@ -8594,7 +8330,9 @@
                 <a:solidFill>
                   <a:srgbClr val="FFFFFF"/>
                 </a:solidFill>
-                <a:latin typeface="inherit"/>
+                <a:latin typeface="Arial" charset="0"/>
+                <a:ea typeface="Arial" charset="0"/>
+                <a:cs typeface="Arial" charset="0"/>
               </a:rPr>
               <a:t>$  </a:t>
             </a:r>
@@ -8603,7 +8341,9 @@
                 <a:solidFill>
                   <a:srgbClr val="FFFFFF"/>
                 </a:solidFill>
-                <a:latin typeface="inherit"/>
+                <a:latin typeface="Arial" charset="0"/>
+                <a:ea typeface="Arial" charset="0"/>
+                <a:cs typeface="Arial" charset="0"/>
               </a:rPr>
               <a:t>git</a:t>
             </a:r>
@@ -8612,7 +8352,9 @@
                 <a:solidFill>
                   <a:srgbClr val="FFFFFF"/>
                 </a:solidFill>
-                <a:latin typeface="inherit"/>
+                <a:latin typeface="Arial" charset="0"/>
+                <a:ea typeface="Arial" charset="0"/>
+                <a:cs typeface="Arial" charset="0"/>
               </a:rPr>
               <a:t> </a:t>
             </a:r>
@@ -8621,7 +8363,9 @@
                 <a:solidFill>
                   <a:srgbClr val="FFFFFF"/>
                 </a:solidFill>
-                <a:latin typeface="inherit"/>
+                <a:latin typeface="Arial" charset="0"/>
+                <a:ea typeface="Arial" charset="0"/>
+                <a:cs typeface="Arial" charset="0"/>
               </a:rPr>
               <a:t>fetch</a:t>
             </a:r>
@@ -8629,7 +8373,9 @@
               <a:solidFill>
                 <a:srgbClr val="FFFFFF"/>
               </a:solidFill>
-              <a:latin typeface="inherit"/>
+              <a:latin typeface="Arial" charset="0"/>
+              <a:ea typeface="Arial" charset="0"/>
+              <a:cs typeface="Arial" charset="0"/>
             </a:endParaRPr>
           </a:p>
           <a:p>
@@ -8650,7 +8396,9 @@
                   <a:srgbClr val="FFFFFF"/>
                 </a:solidFill>
                 <a:effectLst/>
-                <a:latin typeface="inherit"/>
+                <a:latin typeface="Arial" charset="0"/>
+                <a:ea typeface="Arial" charset="0"/>
+                <a:cs typeface="Arial" charset="0"/>
               </a:rPr>
               <a:t>$  </a:t>
             </a:r>
@@ -8663,7 +8411,9 @@
                   <a:srgbClr val="FFFFFF"/>
                 </a:solidFill>
                 <a:effectLst/>
-                <a:latin typeface="inherit"/>
+                <a:latin typeface="Arial" charset="0"/>
+                <a:ea typeface="Arial" charset="0"/>
+                <a:cs typeface="Arial" charset="0"/>
               </a:rPr>
               <a:t>git</a:t>
             </a:r>
@@ -8676,7 +8426,9 @@
                   <a:srgbClr val="FFFFFF"/>
                 </a:solidFill>
                 <a:effectLst/>
-                <a:latin typeface="inherit"/>
+                <a:latin typeface="Arial" charset="0"/>
+                <a:ea typeface="Arial" charset="0"/>
+                <a:cs typeface="Arial" charset="0"/>
               </a:rPr>
               <a:t> </a:t>
             </a:r>
@@ -8689,7 +8441,9 @@
                   <a:srgbClr val="FFFFFF"/>
                 </a:solidFill>
                 <a:effectLst/>
-                <a:latin typeface="inherit"/>
+                <a:latin typeface="Arial" charset="0"/>
+                <a:ea typeface="Arial" charset="0"/>
+                <a:cs typeface="Arial" charset="0"/>
               </a:rPr>
               <a:t>checkout</a:t>
             </a:r>
@@ -8702,7 +8456,9 @@
                   <a:srgbClr val="FFFFFF"/>
                 </a:solidFill>
                 <a:effectLst/>
-                <a:latin typeface="inherit"/>
+                <a:latin typeface="Arial" charset="0"/>
+                <a:ea typeface="Arial" charset="0"/>
+                <a:cs typeface="Arial" charset="0"/>
               </a:rPr>
               <a:t> </a:t>
             </a:r>
@@ -8715,7 +8471,9 @@
                   <a:srgbClr val="FFFFFF"/>
                 </a:solidFill>
                 <a:effectLst/>
-                <a:latin typeface="inherit"/>
+                <a:latin typeface="Arial" charset="0"/>
+                <a:ea typeface="Arial" charset="0"/>
+                <a:cs typeface="Arial" charset="0"/>
               </a:rPr>
               <a:t>my</a:t>
             </a:r>
@@ -8728,7 +8486,9 @@
                   <a:srgbClr val="FFFFFF"/>
                 </a:solidFill>
                 <a:effectLst/>
-                <a:latin typeface="inherit"/>
+                <a:latin typeface="Arial" charset="0"/>
+                <a:ea typeface="Arial" charset="0"/>
+                <a:cs typeface="Arial" charset="0"/>
               </a:rPr>
               <a:t>-feature</a:t>
             </a:r>
@@ -8740,7 +8500,9 @@
                 <a:schemeClr val="tx1"/>
               </a:solidFill>
               <a:effectLst/>
-              <a:latin typeface="Arial" panose="020B0604020202020204" pitchFamily="34" charset="0"/>
+              <a:latin typeface="Arial" charset="0"/>
+              <a:ea typeface="Arial" charset="0"/>
+              <a:cs typeface="Arial" charset="0"/>
             </a:endParaRPr>
           </a:p>
         </p:txBody>
@@ -9594,7 +9356,9 @@
                 <a:solidFill>
                   <a:srgbClr val="FFFFFF"/>
                 </a:solidFill>
-                <a:latin typeface="inherit"/>
+                <a:latin typeface="Arial" charset="0"/>
+                <a:ea typeface="Arial" charset="0"/>
+                <a:cs typeface="Arial" charset="0"/>
               </a:rPr>
               <a:t> $  </a:t>
             </a:r>
@@ -9603,7 +9367,9 @@
                 <a:solidFill>
                   <a:srgbClr val="FFFFFF"/>
                 </a:solidFill>
-                <a:latin typeface="inherit"/>
+                <a:latin typeface="Arial" charset="0"/>
+                <a:ea typeface="Arial" charset="0"/>
+                <a:cs typeface="Arial" charset="0"/>
               </a:rPr>
               <a:t>git</a:t>
             </a:r>
@@ -9616,7 +9382,9 @@
                   <a:srgbClr val="FFFFFF"/>
                 </a:solidFill>
                 <a:effectLst/>
-                <a:latin typeface="inherit"/>
+                <a:latin typeface="Arial" charset="0"/>
+                <a:ea typeface="Arial" charset="0"/>
+                <a:cs typeface="Arial" charset="0"/>
               </a:rPr>
               <a:t> </a:t>
             </a:r>
@@ -9629,7 +9397,9 @@
                   <a:srgbClr val="FFFFFF"/>
                 </a:solidFill>
                 <a:effectLst/>
-                <a:latin typeface="inherit"/>
+                <a:latin typeface="Arial" charset="0"/>
+                <a:ea typeface="Arial" charset="0"/>
+                <a:cs typeface="Arial" charset="0"/>
               </a:rPr>
               <a:t>branch</a:t>
             </a:r>
@@ -9642,7 +9412,9 @@
                   <a:srgbClr val="FFFFFF"/>
                 </a:solidFill>
                 <a:effectLst/>
-                <a:latin typeface="inherit"/>
+                <a:latin typeface="Arial" charset="0"/>
+                <a:ea typeface="Arial" charset="0"/>
+                <a:cs typeface="Arial" charset="0"/>
               </a:rPr>
               <a:t> </a:t>
             </a:r>
@@ -9655,7 +9427,9 @@
                   <a:srgbClr val="FFFFFF"/>
                 </a:solidFill>
                 <a:effectLst/>
-                <a:latin typeface="inherit"/>
+                <a:latin typeface="Arial" charset="0"/>
+                <a:ea typeface="Arial" charset="0"/>
+                <a:cs typeface="Arial" charset="0"/>
               </a:rPr>
               <a:t>my</a:t>
             </a:r>
@@ -9668,7 +9442,9 @@
                   <a:srgbClr val="FFFFFF"/>
                 </a:solidFill>
                 <a:effectLst/>
-                <a:latin typeface="inherit"/>
+                <a:latin typeface="Arial" charset="0"/>
+                <a:ea typeface="Arial" charset="0"/>
+                <a:cs typeface="Arial" charset="0"/>
               </a:rPr>
               <a:t>-feature</a:t>
             </a:r>
@@ -9742,7 +9518,9 @@
                 <a:solidFill>
                   <a:srgbClr val="FFFFFF"/>
                 </a:solidFill>
-                <a:latin typeface="inherit"/>
+                <a:latin typeface="Arial" charset="0"/>
+                <a:ea typeface="Arial" charset="0"/>
+                <a:cs typeface="Arial" charset="0"/>
               </a:rPr>
               <a:t>$  </a:t>
             </a:r>
@@ -9751,7 +9529,9 @@
                 <a:solidFill>
                   <a:srgbClr val="FFFFFF"/>
                 </a:solidFill>
-                <a:latin typeface="inherit"/>
+                <a:latin typeface="Arial" charset="0"/>
+                <a:ea typeface="Arial" charset="0"/>
+                <a:cs typeface="Arial" charset="0"/>
               </a:rPr>
               <a:t>git</a:t>
             </a:r>
@@ -9760,7 +9540,9 @@
                 <a:solidFill>
                   <a:srgbClr val="FFFFFF"/>
                 </a:solidFill>
-                <a:latin typeface="inherit"/>
+                <a:latin typeface="Arial" charset="0"/>
+                <a:ea typeface="Arial" charset="0"/>
+                <a:cs typeface="Arial" charset="0"/>
               </a:rPr>
               <a:t> </a:t>
             </a:r>
@@ -9769,7 +9551,9 @@
                 <a:solidFill>
                   <a:srgbClr val="FFFFFF"/>
                 </a:solidFill>
-                <a:latin typeface="inherit"/>
+                <a:latin typeface="Arial" charset="0"/>
+                <a:ea typeface="Arial" charset="0"/>
+                <a:cs typeface="Arial" charset="0"/>
               </a:rPr>
               <a:t>checkout</a:t>
             </a:r>
@@ -9778,7 +9562,9 @@
                 <a:solidFill>
                   <a:srgbClr val="FFFFFF"/>
                 </a:solidFill>
-                <a:latin typeface="inherit"/>
+                <a:latin typeface="Arial" charset="0"/>
+                <a:ea typeface="Arial" charset="0"/>
+                <a:cs typeface="Arial" charset="0"/>
               </a:rPr>
               <a:t> </a:t>
             </a:r>
@@ -9787,7 +9573,9 @@
                 <a:solidFill>
                   <a:srgbClr val="FFFFFF"/>
                 </a:solidFill>
-                <a:latin typeface="inherit"/>
+                <a:latin typeface="Arial" charset="0"/>
+                <a:ea typeface="Arial" charset="0"/>
+                <a:cs typeface="Arial" charset="0"/>
               </a:rPr>
               <a:t>my</a:t>
             </a:r>
@@ -9796,7 +9584,9 @@
                 <a:solidFill>
                   <a:srgbClr val="FFFFFF"/>
                 </a:solidFill>
-                <a:latin typeface="inherit"/>
+                <a:latin typeface="Arial" charset="0"/>
+                <a:ea typeface="Arial" charset="0"/>
+                <a:cs typeface="Arial" charset="0"/>
               </a:rPr>
               <a:t>-feature</a:t>
             </a:r>
@@ -9808,7 +9598,9 @@
                 <a:schemeClr val="tx1"/>
               </a:solidFill>
               <a:effectLst/>
-              <a:latin typeface="Arial" panose="020B0604020202020204" pitchFamily="34" charset="0"/>
+              <a:latin typeface="Arial" charset="0"/>
+              <a:ea typeface="Arial" charset="0"/>
+              <a:cs typeface="Arial" charset="0"/>
             </a:endParaRPr>
           </a:p>
         </p:txBody>
@@ -10173,6 +9965,529 @@
 </file>
 
 <file path=ppt/slides/slide14.xml><?xml version="1.0" encoding="utf-8"?>
+<p:sld xmlns:a="http://schemas.openxmlformats.org/drawingml/2006/main" xmlns:r="http://schemas.openxmlformats.org/officeDocument/2006/relationships" xmlns:p="http://schemas.openxmlformats.org/presentationml/2006/main">
+  <p:cSld>
+    <p:bg>
+      <p:bgPr>
+        <a:solidFill>
+          <a:srgbClr val="0071BC"/>
+        </a:solidFill>
+        <a:effectLst/>
+      </p:bgPr>
+    </p:bg>
+    <p:spTree>
+      <p:nvGrpSpPr>
+        <p:cNvPr id="1" name=""/>
+        <p:cNvGrpSpPr/>
+        <p:nvPr/>
+      </p:nvGrpSpPr>
+      <p:grpSpPr>
+        <a:xfrm>
+          <a:off x="0" y="0"/>
+          <a:ext cx="0" cy="0"/>
+          <a:chOff x="0" y="0"/>
+          <a:chExt cx="0" cy="0"/>
+        </a:xfrm>
+      </p:grpSpPr>
+      <p:pic>
+        <p:nvPicPr>
+          <p:cNvPr id="6" name="Grafik 5"/>
+          <p:cNvPicPr>
+            <a:picLocks noChangeAspect="1"/>
+          </p:cNvPicPr>
+          <p:nvPr/>
+        </p:nvPicPr>
+        <p:blipFill>
+          <a:blip r:embed="rId3"/>
+          <a:stretch>
+            <a:fillRect/>
+          </a:stretch>
+        </p:blipFill>
+        <p:spPr>
+          <a:xfrm>
+            <a:off x="519112" y="228600"/>
+            <a:ext cx="2452688" cy="1024199"/>
+          </a:xfrm>
+          <a:prstGeom prst="rect">
+            <a:avLst/>
+          </a:prstGeom>
+        </p:spPr>
+      </p:pic>
+      <p:sp>
+        <p:nvSpPr>
+          <p:cNvPr id="5" name="Text Placeholder 2"/>
+          <p:cNvSpPr txBox="1">
+            <a:spLocks/>
+          </p:cNvSpPr>
+          <p:nvPr/>
+        </p:nvSpPr>
+        <p:spPr>
+          <a:xfrm>
+            <a:off x="519112" y="1447800"/>
+            <a:ext cx="11149013" cy="2948354"/>
+          </a:xfrm>
+          <a:prstGeom prst="rect">
+            <a:avLst/>
+          </a:prstGeom>
+        </p:spPr>
+        <p:txBody>
+          <a:bodyPr/>
+          <a:lstStyle>
+            <a:lvl1pPr marL="346075" indent="-346075" algn="l" defTabSz="914363" rtl="0" eaLnBrk="1" latinLnBrk="0" hangingPunct="1">
+              <a:lnSpc>
+                <a:spcPct val="90000"/>
+              </a:lnSpc>
+              <a:spcBef>
+                <a:spcPct val="20000"/>
+              </a:spcBef>
+              <a:buSzPct val="90000"/>
+              <a:buFont typeface="Arial" pitchFamily="34" charset="0"/>
+              <a:buChar char="•"/>
+              <a:defRPr sz="3200" kern="1200">
+                <a:gradFill flip="none" rotWithShape="1">
+                  <a:gsLst>
+                    <a:gs pos="0">
+                      <a:schemeClr val="tx1">
+                        <a:lumMod val="65000"/>
+                        <a:lumOff val="35000"/>
+                      </a:schemeClr>
+                    </a:gs>
+                    <a:gs pos="86000">
+                      <a:schemeClr val="tx1">
+                        <a:lumMod val="75000"/>
+                        <a:lumOff val="25000"/>
+                      </a:schemeClr>
+                    </a:gs>
+                  </a:gsLst>
+                  <a:path path="circle">
+                    <a:fillToRect r="100000" b="100000"/>
+                  </a:path>
+                  <a:tileRect l="-100000" t="-100000"/>
+                </a:gradFill>
+                <a:latin typeface="+mn-lt"/>
+                <a:ea typeface="+mn-ea"/>
+                <a:cs typeface="+mn-cs"/>
+              </a:defRPr>
+            </a:lvl1pPr>
+            <a:lvl2pPr marL="630238" indent="-284163" algn="l" defTabSz="914363" rtl="0" eaLnBrk="1" latinLnBrk="0" hangingPunct="1">
+              <a:lnSpc>
+                <a:spcPct val="90000"/>
+              </a:lnSpc>
+              <a:spcBef>
+                <a:spcPct val="20000"/>
+              </a:spcBef>
+              <a:buSzPct val="90000"/>
+              <a:buFont typeface="Arial" pitchFamily="34" charset="0"/>
+              <a:buChar char="•"/>
+              <a:tabLst>
+                <a:tab pos="630238" algn="l"/>
+              </a:tabLst>
+              <a:defRPr sz="2800" kern="1200">
+                <a:gradFill flip="none" rotWithShape="1">
+                  <a:gsLst>
+                    <a:gs pos="0">
+                      <a:schemeClr val="tx1">
+                        <a:lumMod val="65000"/>
+                        <a:lumOff val="35000"/>
+                      </a:schemeClr>
+                    </a:gs>
+                    <a:gs pos="86000">
+                      <a:schemeClr val="tx1">
+                        <a:lumMod val="75000"/>
+                        <a:lumOff val="25000"/>
+                      </a:schemeClr>
+                    </a:gs>
+                  </a:gsLst>
+                  <a:path path="circle">
+                    <a:fillToRect r="100000" b="100000"/>
+                  </a:path>
+                  <a:tileRect l="-100000" t="-100000"/>
+                </a:gradFill>
+                <a:latin typeface="+mn-lt"/>
+                <a:ea typeface="+mn-ea"/>
+                <a:cs typeface="+mn-cs"/>
+              </a:defRPr>
+            </a:lvl2pPr>
+            <a:lvl3pPr marL="914400" indent="-284163" algn="l" defTabSz="914363" rtl="0" eaLnBrk="1" latinLnBrk="0" hangingPunct="1">
+              <a:lnSpc>
+                <a:spcPct val="90000"/>
+              </a:lnSpc>
+              <a:spcBef>
+                <a:spcPct val="20000"/>
+              </a:spcBef>
+              <a:buSzPct val="90000"/>
+              <a:buFont typeface="Arial" pitchFamily="34" charset="0"/>
+              <a:buChar char="•"/>
+              <a:defRPr sz="2400" kern="1200">
+                <a:gradFill flip="none" rotWithShape="1">
+                  <a:gsLst>
+                    <a:gs pos="0">
+                      <a:schemeClr val="tx1">
+                        <a:lumMod val="65000"/>
+                        <a:lumOff val="35000"/>
+                      </a:schemeClr>
+                    </a:gs>
+                    <a:gs pos="86000">
+                      <a:schemeClr val="tx1">
+                        <a:lumMod val="75000"/>
+                        <a:lumOff val="25000"/>
+                      </a:schemeClr>
+                    </a:gs>
+                  </a:gsLst>
+                  <a:path path="circle">
+                    <a:fillToRect r="100000" b="100000"/>
+                  </a:path>
+                  <a:tileRect l="-100000" t="-100000"/>
+                </a:gradFill>
+                <a:latin typeface="+mn-lt"/>
+                <a:ea typeface="+mn-ea"/>
+                <a:cs typeface="+mn-cs"/>
+              </a:defRPr>
+            </a:lvl3pPr>
+            <a:lvl4pPr marL="1482725" indent="-223838" algn="l" defTabSz="914363" rtl="0" eaLnBrk="1" latinLnBrk="0" hangingPunct="1">
+              <a:lnSpc>
+                <a:spcPct val="90000"/>
+              </a:lnSpc>
+              <a:spcBef>
+                <a:spcPct val="20000"/>
+              </a:spcBef>
+              <a:buSzPct val="90000"/>
+              <a:buFont typeface="Arial" pitchFamily="34" charset="0"/>
+              <a:buChar char="•"/>
+              <a:tabLst>
+                <a:tab pos="914400" algn="l"/>
+              </a:tabLst>
+              <a:defRPr sz="2000" kern="1200">
+                <a:gradFill flip="none" rotWithShape="1">
+                  <a:gsLst>
+                    <a:gs pos="0">
+                      <a:schemeClr val="tx1">
+                        <a:lumMod val="65000"/>
+                        <a:lumOff val="35000"/>
+                      </a:schemeClr>
+                    </a:gs>
+                    <a:gs pos="86000">
+                      <a:schemeClr val="tx1">
+                        <a:lumMod val="75000"/>
+                        <a:lumOff val="25000"/>
+                      </a:schemeClr>
+                    </a:gs>
+                  </a:gsLst>
+                  <a:path path="circle">
+                    <a:fillToRect r="100000" b="100000"/>
+                  </a:path>
+                  <a:tileRect l="-100000" t="-100000"/>
+                </a:gradFill>
+                <a:latin typeface="+mn-lt"/>
+                <a:ea typeface="+mn-ea"/>
+                <a:cs typeface="+mn-cs"/>
+              </a:defRPr>
+            </a:lvl4pPr>
+            <a:lvl5pPr marL="1712913" indent="-230188" algn="l" defTabSz="914363" rtl="0" eaLnBrk="1" latinLnBrk="0" hangingPunct="1">
+              <a:lnSpc>
+                <a:spcPct val="90000"/>
+              </a:lnSpc>
+              <a:spcBef>
+                <a:spcPct val="20000"/>
+              </a:spcBef>
+              <a:buSzPct val="90000"/>
+              <a:buFont typeface="Arial" pitchFamily="34" charset="0"/>
+              <a:buChar char="•"/>
+              <a:defRPr sz="2000" kern="1200">
+                <a:gradFill flip="none" rotWithShape="1">
+                  <a:gsLst>
+                    <a:gs pos="0">
+                      <a:schemeClr val="tx1">
+                        <a:lumMod val="65000"/>
+                        <a:lumOff val="35000"/>
+                      </a:schemeClr>
+                    </a:gs>
+                    <a:gs pos="86000">
+                      <a:schemeClr val="tx1">
+                        <a:lumMod val="75000"/>
+                        <a:lumOff val="25000"/>
+                      </a:schemeClr>
+                    </a:gs>
+                  </a:gsLst>
+                  <a:path path="circle">
+                    <a:fillToRect r="100000" b="100000"/>
+                  </a:path>
+                  <a:tileRect l="-100000" t="-100000"/>
+                </a:gradFill>
+                <a:latin typeface="+mn-lt"/>
+                <a:ea typeface="+mn-ea"/>
+                <a:cs typeface="+mn-cs"/>
+              </a:defRPr>
+            </a:lvl5pPr>
+            <a:lvl6pPr marL="2514499" indent="-228591" algn="l" defTabSz="914363" rtl="0" eaLnBrk="1" latinLnBrk="0" hangingPunct="1">
+              <a:spcBef>
+                <a:spcPct val="20000"/>
+              </a:spcBef>
+              <a:buFont typeface="Arial" pitchFamily="34" charset="0"/>
+              <a:buChar char="•"/>
+              <a:defRPr sz="2000" kern="1200">
+                <a:solidFill>
+                  <a:schemeClr val="tx1"/>
+                </a:solidFill>
+                <a:latin typeface="+mn-lt"/>
+                <a:ea typeface="+mn-ea"/>
+                <a:cs typeface="+mn-cs"/>
+              </a:defRPr>
+            </a:lvl6pPr>
+            <a:lvl7pPr marL="2971681" indent="-228591" algn="l" defTabSz="914363" rtl="0" eaLnBrk="1" latinLnBrk="0" hangingPunct="1">
+              <a:spcBef>
+                <a:spcPct val="20000"/>
+              </a:spcBef>
+              <a:buFont typeface="Arial" pitchFamily="34" charset="0"/>
+              <a:buChar char="•"/>
+              <a:defRPr sz="2000" kern="1200">
+                <a:solidFill>
+                  <a:schemeClr val="tx1"/>
+                </a:solidFill>
+                <a:latin typeface="+mn-lt"/>
+                <a:ea typeface="+mn-ea"/>
+                <a:cs typeface="+mn-cs"/>
+              </a:defRPr>
+            </a:lvl7pPr>
+            <a:lvl8pPr marL="3428863" indent="-228591" algn="l" defTabSz="914363" rtl="0" eaLnBrk="1" latinLnBrk="0" hangingPunct="1">
+              <a:spcBef>
+                <a:spcPct val="20000"/>
+              </a:spcBef>
+              <a:buFont typeface="Arial" pitchFamily="34" charset="0"/>
+              <a:buChar char="•"/>
+              <a:defRPr sz="2000" kern="1200">
+                <a:solidFill>
+                  <a:schemeClr val="tx1"/>
+                </a:solidFill>
+                <a:latin typeface="+mn-lt"/>
+                <a:ea typeface="+mn-ea"/>
+                <a:cs typeface="+mn-cs"/>
+              </a:defRPr>
+            </a:lvl8pPr>
+            <a:lvl9pPr marL="3886045" indent="-228591" algn="l" defTabSz="914363" rtl="0" eaLnBrk="1" latinLnBrk="0" hangingPunct="1">
+              <a:spcBef>
+                <a:spcPct val="20000"/>
+              </a:spcBef>
+              <a:buFont typeface="Arial" pitchFamily="34" charset="0"/>
+              <a:buChar char="•"/>
+              <a:defRPr sz="2000" kern="1200">
+                <a:solidFill>
+                  <a:schemeClr val="tx1"/>
+                </a:solidFill>
+                <a:latin typeface="+mn-lt"/>
+                <a:ea typeface="+mn-ea"/>
+                <a:cs typeface="+mn-cs"/>
+              </a:defRPr>
+            </a:lvl9pPr>
+          </a:lstStyle>
+          <a:p>
+            <a:pPr marL="0" indent="0">
+              <a:buNone/>
+            </a:pPr>
+            <a:r>
+              <a:rPr lang="de-DE" dirty="0" smtClean="0">
+                <a:ln w="3175">
+                  <a:noFill/>
+                </a:ln>
+                <a:gradFill>
+                  <a:gsLst>
+                    <a:gs pos="96667">
+                      <a:srgbClr val="FFFFFF"/>
+                    </a:gs>
+                    <a:gs pos="90000">
+                      <a:srgbClr val="FFFFFF"/>
+                    </a:gs>
+                  </a:gsLst>
+                  <a:lin ang="5400000" scaled="0"/>
+                </a:gradFill>
+                <a:cs typeface="Arial" charset="0"/>
+                <a:hlinkClick r:id="rId4"/>
+              </a:rPr>
+              <a:t>.gitignore</a:t>
+            </a:r>
+          </a:p>
+          <a:p>
+            <a:pPr marL="0" indent="0">
+              <a:buNone/>
+            </a:pPr>
+            <a:r>
+              <a:rPr lang="de-DE" dirty="0" smtClean="0">
+                <a:ln w="3175">
+                  <a:noFill/>
+                </a:ln>
+                <a:gradFill>
+                  <a:gsLst>
+                    <a:gs pos="96667">
+                      <a:srgbClr val="FFFFFF"/>
+                    </a:gs>
+                    <a:gs pos="90000">
+                      <a:srgbClr val="FFFFFF"/>
+                    </a:gs>
+                  </a:gsLst>
+                  <a:lin ang="5400000" scaled="0"/>
+                </a:gradFill>
+                <a:cs typeface="Arial" charset="0"/>
+                <a:hlinkClick r:id="rId4"/>
+              </a:rPr>
+              <a:t>https</a:t>
+            </a:r>
+            <a:r>
+              <a:rPr lang="de-DE" dirty="0">
+                <a:ln w="3175">
+                  <a:noFill/>
+                </a:ln>
+                <a:gradFill>
+                  <a:gsLst>
+                    <a:gs pos="96667">
+                      <a:srgbClr val="FFFFFF"/>
+                    </a:gs>
+                    <a:gs pos="90000">
+                      <a:srgbClr val="FFFFFF"/>
+                    </a:gs>
+                  </a:gsLst>
+                  <a:lin ang="5400000" scaled="0"/>
+                </a:gradFill>
+                <a:cs typeface="Arial" charset="0"/>
+                <a:hlinkClick r:id="rId4"/>
+              </a:rPr>
+              <a:t>://github.com/github/gitignore</a:t>
+            </a:r>
+          </a:p>
+          <a:p>
+            <a:pPr marL="0" indent="0">
+              <a:buNone/>
+            </a:pPr>
+            <a:r>
+              <a:rPr lang="de-DE" dirty="0" smtClean="0">
+                <a:ln w="3175">
+                  <a:noFill/>
+                </a:ln>
+                <a:gradFill>
+                  <a:gsLst>
+                    <a:gs pos="96667">
+                      <a:srgbClr val="FFFFFF"/>
+                    </a:gs>
+                    <a:gs pos="90000">
+                      <a:srgbClr val="FFFFFF"/>
+                    </a:gs>
+                  </a:gsLst>
+                  <a:lin ang="5400000" scaled="0"/>
+                </a:gradFill>
+                <a:cs typeface="Arial" charset="0"/>
+                <a:hlinkClick r:id="rId4"/>
+              </a:rPr>
+              <a:t>https</a:t>
+            </a:r>
+            <a:r>
+              <a:rPr lang="de-DE" dirty="0">
+                <a:ln w="3175">
+                  <a:noFill/>
+                </a:ln>
+                <a:gradFill>
+                  <a:gsLst>
+                    <a:gs pos="96667">
+                      <a:srgbClr val="FFFFFF"/>
+                    </a:gs>
+                    <a:gs pos="90000">
+                      <a:srgbClr val="FFFFFF"/>
+                    </a:gs>
+                  </a:gsLst>
+                  <a:lin ang="5400000" scaled="0"/>
+                </a:gradFill>
+                <a:cs typeface="Arial" charset="0"/>
+                <a:hlinkClick r:id="rId4"/>
+              </a:rPr>
+              <a:t>://www.gitignore.io</a:t>
+            </a:r>
+            <a:r>
+              <a:rPr lang="de-DE" dirty="0" smtClean="0">
+                <a:ln w="3175">
+                  <a:noFill/>
+                </a:ln>
+                <a:gradFill>
+                  <a:gsLst>
+                    <a:gs pos="96667">
+                      <a:srgbClr val="FFFFFF"/>
+                    </a:gs>
+                    <a:gs pos="90000">
+                      <a:srgbClr val="FFFFFF"/>
+                    </a:gs>
+                  </a:gsLst>
+                  <a:lin ang="5400000" scaled="0"/>
+                </a:gradFill>
+                <a:cs typeface="Arial" charset="0"/>
+                <a:hlinkClick r:id="rId4"/>
+              </a:rPr>
+              <a:t>/</a:t>
+            </a:r>
+            <a:endParaRPr lang="de-DE" dirty="0" smtClean="0">
+              <a:ln w="3175">
+                <a:noFill/>
+              </a:ln>
+              <a:gradFill>
+                <a:gsLst>
+                  <a:gs pos="96667">
+                    <a:srgbClr val="FFFFFF"/>
+                  </a:gs>
+                  <a:gs pos="90000">
+                    <a:srgbClr val="FFFFFF"/>
+                  </a:gs>
+                </a:gsLst>
+                <a:lin ang="5400000" scaled="0"/>
+              </a:gradFill>
+              <a:cs typeface="Arial" charset="0"/>
+            </a:endParaRPr>
+          </a:p>
+          <a:p>
+            <a:pPr marL="0" indent="0">
+              <a:buNone/>
+            </a:pPr>
+            <a:endParaRPr lang="de-DE" dirty="0">
+              <a:ln w="3175">
+                <a:noFill/>
+              </a:ln>
+              <a:gradFill>
+                <a:gsLst>
+                  <a:gs pos="96667">
+                    <a:srgbClr val="FFFFFF"/>
+                  </a:gs>
+                  <a:gs pos="90000">
+                    <a:srgbClr val="FFFFFF"/>
+                  </a:gs>
+                </a:gsLst>
+                <a:lin ang="5400000" scaled="0"/>
+              </a:gradFill>
+              <a:cs typeface="Arial" charset="0"/>
+            </a:endParaRPr>
+          </a:p>
+        </p:txBody>
+      </p:sp>
+    </p:spTree>
+    <p:extLst>
+      <p:ext uri="{BB962C8B-B14F-4D97-AF65-F5344CB8AC3E}">
+        <p14:creationId xmlns:p14="http://schemas.microsoft.com/office/powerpoint/2010/main" val="904858939"/>
+      </p:ext>
+    </p:extLst>
+  </p:cSld>
+  <p:clrMapOvr>
+    <a:masterClrMapping/>
+  </p:clrMapOvr>
+  <mc:AlternateContent xmlns:mc="http://schemas.openxmlformats.org/markup-compatibility/2006" xmlns:p14="http://schemas.microsoft.com/office/powerpoint/2010/main">
+    <mc:Choice Requires="p14">
+      <p:transition spd="slow" p14:dur="1500">
+        <p:push/>
+      </p:transition>
+    </mc:Choice>
+    <mc:Fallback xmlns="">
+      <p:transition spd="slow">
+        <p:push/>
+      </p:transition>
+    </mc:Fallback>
+  </mc:AlternateContent>
+</p:sld>
+</file>
+
+<file path=ppt/slides/slide15.xml><?xml version="1.0" encoding="utf-8"?>
 <p:sld xmlns:a="http://schemas.openxmlformats.org/drawingml/2006/main" xmlns:r="http://schemas.openxmlformats.org/officeDocument/2006/relationships" xmlns:p="http://schemas.openxmlformats.org/presentationml/2006/main">
   <p:cSld>
     <p:spTree>
@@ -13410,7 +13725,9 @@
                   <a:srgbClr val="FFFFFF"/>
                 </a:solidFill>
                 <a:effectLst/>
-                <a:latin typeface="inherit"/>
+                <a:latin typeface="Arial" charset="0"/>
+                <a:ea typeface="Arial" charset="0"/>
+                <a:cs typeface="Arial" charset="0"/>
               </a:rPr>
               <a:t> $  </a:t>
             </a:r>
@@ -13423,7 +13740,9 @@
                   <a:srgbClr val="FFFFFF"/>
                 </a:solidFill>
                 <a:effectLst/>
-                <a:latin typeface="inherit"/>
+                <a:latin typeface="Arial" charset="0"/>
+                <a:ea typeface="Arial" charset="0"/>
+                <a:cs typeface="Arial" charset="0"/>
               </a:rPr>
               <a:t>git</a:t>
             </a:r>
@@ -13436,7 +13755,9 @@
                   <a:srgbClr val="FFFFFF"/>
                 </a:solidFill>
                 <a:effectLst/>
-                <a:latin typeface="inherit"/>
+                <a:latin typeface="Arial" charset="0"/>
+                <a:ea typeface="Arial" charset="0"/>
+                <a:cs typeface="Arial" charset="0"/>
               </a:rPr>
               <a:t> </a:t>
             </a:r>
@@ -13449,7 +13770,9 @@
                   <a:srgbClr val="FFFFFF"/>
                 </a:solidFill>
                 <a:effectLst/>
-                <a:latin typeface="inherit"/>
+                <a:latin typeface="Arial" charset="0"/>
+                <a:ea typeface="Arial" charset="0"/>
+                <a:cs typeface="Arial" charset="0"/>
               </a:rPr>
               <a:t>config</a:t>
             </a:r>
@@ -13462,7 +13785,9 @@
                   <a:srgbClr val="FFFFFF"/>
                 </a:solidFill>
                 <a:effectLst/>
-                <a:latin typeface="inherit"/>
+                <a:latin typeface="Arial" charset="0"/>
+                <a:ea typeface="Arial" charset="0"/>
+                <a:cs typeface="Arial" charset="0"/>
               </a:rPr>
               <a:t> --global user.name "</a:t>
             </a:r>
@@ -13475,7 +13800,9 @@
                   <a:srgbClr val="F9FE64"/>
                 </a:solidFill>
                 <a:effectLst/>
-                <a:latin typeface="inherit"/>
+                <a:latin typeface="Arial" charset="0"/>
+                <a:ea typeface="Arial" charset="0"/>
+                <a:cs typeface="Arial" charset="0"/>
               </a:rPr>
               <a:t>YOUR NAME</a:t>
             </a:r>
@@ -13488,7 +13815,9 @@
                   <a:srgbClr val="FFFFFF"/>
                 </a:solidFill>
                 <a:effectLst/>
-                <a:latin typeface="inherit"/>
+                <a:latin typeface="Arial" charset="0"/>
+                <a:ea typeface="Arial" charset="0"/>
+                <a:cs typeface="Arial" charset="0"/>
               </a:rPr>
               <a:t>"</a:t>
             </a:r>
@@ -13501,19 +13830,12 @@
                   <a:schemeClr val="tx1"/>
                 </a:solidFill>
                 <a:effectLst/>
+                <a:latin typeface="Arial" charset="0"/>
+                <a:ea typeface="Arial" charset="0"/>
+                <a:cs typeface="Arial" charset="0"/>
               </a:rPr>
               <a:t> </a:t>
             </a:r>
-            <a:endParaRPr kumimoji="0" lang="de-DE" altLang="de-DE" sz="2800" b="0" i="0" u="none" strike="noStrike" cap="none" normalizeH="0" baseline="0" dirty="0">
-              <a:ln>
-                <a:noFill/>
-              </a:ln>
-              <a:solidFill>
-                <a:schemeClr val="tx1"/>
-              </a:solidFill>
-              <a:effectLst/>
-              <a:latin typeface="Arial" panose="020B0604020202020204" pitchFamily="34" charset="0"/>
-            </a:endParaRPr>
           </a:p>
         </p:txBody>
       </p:sp>
@@ -13588,7 +13910,9 @@
                   <a:srgbClr val="FFFFFF"/>
                 </a:solidFill>
                 <a:effectLst/>
-                <a:latin typeface="inherit"/>
+                <a:latin typeface="Arial" charset="0"/>
+                <a:ea typeface="Arial" charset="0"/>
+                <a:cs typeface="Arial" charset="0"/>
               </a:rPr>
               <a:t> $  </a:t>
             </a:r>
@@ -13597,7 +13921,9 @@
                 <a:solidFill>
                   <a:srgbClr val="FFFFFF"/>
                 </a:solidFill>
-                <a:latin typeface="inherit"/>
+                <a:latin typeface="Arial" charset="0"/>
+                <a:ea typeface="Arial" charset="0"/>
+                <a:cs typeface="Arial" charset="0"/>
               </a:rPr>
               <a:t>git</a:t>
             </a:r>
@@ -13606,7 +13932,9 @@
                 <a:solidFill>
                   <a:srgbClr val="FFFFFF"/>
                 </a:solidFill>
-                <a:latin typeface="inherit"/>
+                <a:latin typeface="Arial" charset="0"/>
+                <a:ea typeface="Arial" charset="0"/>
+                <a:cs typeface="Arial" charset="0"/>
               </a:rPr>
               <a:t> </a:t>
             </a:r>
@@ -13615,7 +13943,9 @@
                 <a:solidFill>
                   <a:srgbClr val="FFFFFF"/>
                 </a:solidFill>
-                <a:latin typeface="inherit"/>
+                <a:latin typeface="Arial" charset="0"/>
+                <a:ea typeface="Arial" charset="0"/>
+                <a:cs typeface="Arial" charset="0"/>
               </a:rPr>
               <a:t>config</a:t>
             </a:r>
@@ -13624,7 +13954,9 @@
                 <a:solidFill>
                   <a:srgbClr val="FFFFFF"/>
                 </a:solidFill>
-                <a:latin typeface="inherit"/>
+                <a:latin typeface="Arial" charset="0"/>
+                <a:ea typeface="Arial" charset="0"/>
+                <a:cs typeface="Arial" charset="0"/>
               </a:rPr>
               <a:t> --global </a:t>
             </a:r>
@@ -13633,7 +13965,9 @@
                 <a:solidFill>
                   <a:srgbClr val="FFFFFF"/>
                 </a:solidFill>
-                <a:latin typeface="inherit"/>
+                <a:latin typeface="Arial" charset="0"/>
+                <a:ea typeface="Arial" charset="0"/>
+                <a:cs typeface="Arial" charset="0"/>
               </a:rPr>
               <a:t>user.email</a:t>
             </a:r>
@@ -13642,7 +13976,9 @@
                 <a:solidFill>
                   <a:srgbClr val="FFFFFF"/>
                 </a:solidFill>
-                <a:latin typeface="inherit"/>
+                <a:latin typeface="Arial" charset="0"/>
+                <a:ea typeface="Arial" charset="0"/>
+                <a:cs typeface="Arial" charset="0"/>
               </a:rPr>
               <a:t> "</a:t>
             </a:r>
@@ -13651,7 +13987,9 @@
                 <a:solidFill>
                   <a:srgbClr val="F9FE64"/>
                 </a:solidFill>
-                <a:latin typeface="inherit"/>
+                <a:latin typeface="Arial" charset="0"/>
+                <a:ea typeface="Arial" charset="0"/>
+                <a:cs typeface="Arial" charset="0"/>
               </a:rPr>
               <a:t>YOUR EMAIL ADDRESS</a:t>
             </a:r>
@@ -13660,16 +13998,24 @@
                 <a:solidFill>
                   <a:srgbClr val="FFFFFF"/>
                 </a:solidFill>
-                <a:latin typeface="inherit"/>
+                <a:latin typeface="Arial" charset="0"/>
+                <a:ea typeface="Arial" charset="0"/>
+                <a:cs typeface="Arial" charset="0"/>
               </a:rPr>
               <a:t>"</a:t>
             </a:r>
             <a:r>
-              <a:rPr lang="de-DE" altLang="de-DE" sz="800" dirty="0"/>
+              <a:rPr lang="de-DE" altLang="de-DE" sz="800" dirty="0">
+                <a:latin typeface="Arial" charset="0"/>
+                <a:ea typeface="Arial" charset="0"/>
+                <a:cs typeface="Arial" charset="0"/>
+              </a:rPr>
               <a:t> </a:t>
             </a:r>
             <a:endParaRPr lang="de-DE" altLang="de-DE" sz="6000" dirty="0">
-              <a:latin typeface="Arial" panose="020B0604020202020204" pitchFamily="34" charset="0"/>
+              <a:latin typeface="Arial" charset="0"/>
+              <a:ea typeface="Arial" charset="0"/>
+              <a:cs typeface="Arial" charset="0"/>
             </a:endParaRPr>
           </a:p>
         </p:txBody>
@@ -14758,7 +15104,9 @@
                   <a:srgbClr val="FFFFFF"/>
                 </a:solidFill>
                 <a:effectLst/>
-                <a:latin typeface="inherit"/>
+                <a:latin typeface="Arial" charset="0"/>
+                <a:ea typeface="Arial" charset="0"/>
+                <a:cs typeface="Arial" charset="0"/>
               </a:rPr>
               <a:t> $  </a:t>
             </a:r>
@@ -14771,7 +15119,9 @@
                   <a:srgbClr val="FFFFFF"/>
                 </a:solidFill>
                 <a:effectLst/>
-                <a:latin typeface="inherit"/>
+                <a:latin typeface="Arial" charset="0"/>
+                <a:ea typeface="Arial" charset="0"/>
+                <a:cs typeface="Arial" charset="0"/>
               </a:rPr>
               <a:t>mkdir</a:t>
             </a:r>
@@ -14784,7 +15134,9 @@
                   <a:srgbClr val="FFFFFF"/>
                 </a:solidFill>
                 <a:effectLst/>
-                <a:latin typeface="inherit"/>
+                <a:latin typeface="Arial" charset="0"/>
+                <a:ea typeface="Arial" charset="0"/>
+                <a:cs typeface="Arial" charset="0"/>
               </a:rPr>
               <a:t> </a:t>
             </a:r>
@@ -14797,7 +15149,9 @@
                   <a:srgbClr val="FFFFFF"/>
                 </a:solidFill>
                 <a:effectLst/>
-                <a:latin typeface="inherit"/>
+                <a:latin typeface="Arial" charset="0"/>
+                <a:ea typeface="Arial" charset="0"/>
+                <a:cs typeface="Arial" charset="0"/>
               </a:rPr>
               <a:t>meinprojekt</a:t>
             </a:r>
@@ -14809,7 +15163,9 @@
                 <a:srgbClr val="FFFFFF"/>
               </a:solidFill>
               <a:effectLst/>
-              <a:latin typeface="inherit"/>
+              <a:latin typeface="Arial" charset="0"/>
+              <a:ea typeface="Arial" charset="0"/>
+              <a:cs typeface="Arial" charset="0"/>
             </a:endParaRPr>
           </a:p>
           <a:p>
@@ -14834,7 +15190,9 @@
                 <a:solidFill>
                   <a:srgbClr val="FFFFFF"/>
                 </a:solidFill>
-                <a:latin typeface="inherit"/>
+                <a:latin typeface="Arial" charset="0"/>
+                <a:ea typeface="Arial" charset="0"/>
+                <a:cs typeface="Arial" charset="0"/>
               </a:rPr>
               <a:t> $  cd </a:t>
             </a:r>
@@ -14843,7 +15201,9 @@
                 <a:solidFill>
                   <a:srgbClr val="FFFFFF"/>
                 </a:solidFill>
-                <a:latin typeface="inherit"/>
+                <a:latin typeface="Arial" charset="0"/>
+                <a:ea typeface="Arial" charset="0"/>
+                <a:cs typeface="Arial" charset="0"/>
               </a:rPr>
               <a:t>meinprojekt</a:t>
             </a:r>
@@ -14851,7 +15211,9 @@
               <a:solidFill>
                 <a:srgbClr val="FFFFFF"/>
               </a:solidFill>
-              <a:latin typeface="inherit"/>
+              <a:latin typeface="Arial" charset="0"/>
+              <a:ea typeface="Arial" charset="0"/>
+              <a:cs typeface="Arial" charset="0"/>
             </a:endParaRPr>
           </a:p>
           <a:p>
@@ -14880,7 +15242,9 @@
                   <a:srgbClr val="FFFFFF"/>
                 </a:solidFill>
                 <a:effectLst/>
-                <a:latin typeface="inherit"/>
+                <a:latin typeface="Arial" charset="0"/>
+                <a:ea typeface="Arial" charset="0"/>
+                <a:cs typeface="Arial" charset="0"/>
               </a:rPr>
               <a:t> </a:t>
             </a:r>
@@ -14889,7 +15253,9 @@
                 <a:solidFill>
                   <a:srgbClr val="FFFFFF"/>
                 </a:solidFill>
-                <a:latin typeface="inherit"/>
+                <a:latin typeface="Arial" charset="0"/>
+                <a:ea typeface="Arial" charset="0"/>
+                <a:cs typeface="Arial" charset="0"/>
               </a:rPr>
               <a:t>$  </a:t>
             </a:r>
@@ -14898,7 +15264,9 @@
                 <a:solidFill>
                   <a:srgbClr val="FFFFFF"/>
                 </a:solidFill>
-                <a:latin typeface="inherit"/>
+                <a:latin typeface="Arial" charset="0"/>
+                <a:ea typeface="Arial" charset="0"/>
+                <a:cs typeface="Arial" charset="0"/>
               </a:rPr>
               <a:t>git</a:t>
             </a:r>
@@ -14907,7 +15275,9 @@
                 <a:solidFill>
                   <a:srgbClr val="FFFFFF"/>
                 </a:solidFill>
-                <a:latin typeface="inherit"/>
+                <a:latin typeface="Arial" charset="0"/>
+                <a:ea typeface="Arial" charset="0"/>
+                <a:cs typeface="Arial" charset="0"/>
               </a:rPr>
               <a:t> </a:t>
             </a:r>
@@ -14916,7 +15286,9 @@
                 <a:solidFill>
                   <a:srgbClr val="FFFFFF"/>
                 </a:solidFill>
-                <a:latin typeface="inherit"/>
+                <a:latin typeface="Arial" charset="0"/>
+                <a:ea typeface="Arial" charset="0"/>
+                <a:cs typeface="Arial" charset="0"/>
               </a:rPr>
               <a:t>init</a:t>
             </a:r>
@@ -14928,7 +15300,9 @@
                 <a:schemeClr val="tx1"/>
               </a:solidFill>
               <a:effectLst/>
-              <a:latin typeface="Arial" panose="020B0604020202020204" pitchFamily="34" charset="0"/>
+              <a:latin typeface="Arial" charset="0"/>
+              <a:ea typeface="Arial" charset="0"/>
+              <a:cs typeface="Arial" charset="0"/>
             </a:endParaRPr>
           </a:p>
         </p:txBody>
@@ -15380,7 +15754,9 @@
                   <a:srgbClr val="FFFFFF"/>
                 </a:solidFill>
                 <a:effectLst/>
-                <a:latin typeface="inherit"/>
+                <a:latin typeface="Arial" charset="0"/>
+                <a:ea typeface="Arial" charset="0"/>
+                <a:cs typeface="Arial" charset="0"/>
               </a:rPr>
               <a:t> $  </a:t>
             </a:r>
@@ -15393,7 +15769,9 @@
                   <a:srgbClr val="FFFFFF"/>
                 </a:solidFill>
                 <a:effectLst/>
-                <a:latin typeface="inherit"/>
+                <a:latin typeface="Arial" charset="0"/>
+                <a:ea typeface="Arial" charset="0"/>
+                <a:cs typeface="Arial" charset="0"/>
               </a:rPr>
               <a:t>git</a:t>
             </a:r>
@@ -15406,7 +15784,9 @@
                   <a:srgbClr val="FFFFFF"/>
                 </a:solidFill>
                 <a:effectLst/>
-                <a:latin typeface="inherit"/>
+                <a:latin typeface="Arial" charset="0"/>
+                <a:ea typeface="Arial" charset="0"/>
+                <a:cs typeface="Arial" charset="0"/>
               </a:rPr>
               <a:t> </a:t>
             </a:r>
@@ -15419,7 +15799,9 @@
                   <a:srgbClr val="FFFFFF"/>
                 </a:solidFill>
                 <a:effectLst/>
-                <a:latin typeface="inherit"/>
+                <a:latin typeface="Arial" charset="0"/>
+                <a:ea typeface="Arial" charset="0"/>
+                <a:cs typeface="Arial" charset="0"/>
               </a:rPr>
               <a:t>status</a:t>
             </a:r>
@@ -15431,7 +15813,9 @@
                 <a:srgbClr val="FFFFFF"/>
               </a:solidFill>
               <a:effectLst/>
-              <a:latin typeface="inherit"/>
+              <a:latin typeface="Arial" charset="0"/>
+              <a:ea typeface="Arial" charset="0"/>
+              <a:cs typeface="Arial" charset="0"/>
             </a:endParaRPr>
           </a:p>
         </p:txBody>
@@ -15927,7 +16311,9 @@
                   <a:srgbClr val="FFFFFF"/>
                 </a:solidFill>
                 <a:effectLst/>
-                <a:latin typeface="inherit"/>
+                <a:latin typeface="Arial" charset="0"/>
+                <a:ea typeface="Arial" charset="0"/>
+                <a:cs typeface="Arial" charset="0"/>
               </a:rPr>
               <a:t> $  </a:t>
             </a:r>
@@ -15940,7 +16326,9 @@
                   <a:srgbClr val="FFFFFF"/>
                 </a:solidFill>
                 <a:effectLst/>
-                <a:latin typeface="inherit"/>
+                <a:latin typeface="Arial" charset="0"/>
+                <a:ea typeface="Arial" charset="0"/>
+                <a:cs typeface="Arial" charset="0"/>
               </a:rPr>
               <a:t>git</a:t>
             </a:r>
@@ -15953,7 +16341,9 @@
                   <a:srgbClr val="FFFFFF"/>
                 </a:solidFill>
                 <a:effectLst/>
-                <a:latin typeface="inherit"/>
+                <a:latin typeface="Arial" charset="0"/>
+                <a:ea typeface="Arial" charset="0"/>
+                <a:cs typeface="Arial" charset="0"/>
               </a:rPr>
               <a:t> </a:t>
             </a:r>
@@ -15966,7 +16356,9 @@
                   <a:srgbClr val="FFFFFF"/>
                 </a:solidFill>
                 <a:effectLst/>
-                <a:latin typeface="inherit"/>
+                <a:latin typeface="Arial" charset="0"/>
+                <a:ea typeface="Arial" charset="0"/>
+                <a:cs typeface="Arial" charset="0"/>
               </a:rPr>
               <a:t>add</a:t>
             </a:r>
@@ -15979,7 +16371,9 @@
                   <a:srgbClr val="FFFFFF"/>
                 </a:solidFill>
                 <a:effectLst/>
-                <a:latin typeface="inherit"/>
+                <a:latin typeface="Arial" charset="0"/>
+                <a:ea typeface="Arial" charset="0"/>
+                <a:cs typeface="Arial" charset="0"/>
               </a:rPr>
               <a:t> info.txt</a:t>
             </a:r>
@@ -15991,7 +16385,9 @@
                 <a:schemeClr val="tx1"/>
               </a:solidFill>
               <a:effectLst/>
-              <a:latin typeface="Arial" panose="020B0604020202020204" pitchFamily="34" charset="0"/>
+              <a:latin typeface="Arial" charset="0"/>
+              <a:ea typeface="Arial" charset="0"/>
+              <a:cs typeface="Arial" charset="0"/>
             </a:endParaRPr>
           </a:p>
         </p:txBody>
@@ -16067,7 +16463,9 @@
                   <a:srgbClr val="FFFFFF"/>
                 </a:solidFill>
                 <a:effectLst/>
-                <a:latin typeface="inherit"/>
+                <a:latin typeface="Arial" charset="0"/>
+                <a:ea typeface="Arial" charset="0"/>
+                <a:cs typeface="Arial" charset="0"/>
               </a:rPr>
               <a:t> $  </a:t>
             </a:r>
@@ -16076,7 +16474,9 @@
                 <a:solidFill>
                   <a:srgbClr val="FFFFFF"/>
                 </a:solidFill>
-                <a:latin typeface="inherit"/>
+                <a:latin typeface="Arial" charset="0"/>
+                <a:ea typeface="Arial" charset="0"/>
+                <a:cs typeface="Arial" charset="0"/>
               </a:rPr>
               <a:t>git</a:t>
             </a:r>
@@ -16085,7 +16485,9 @@
                 <a:solidFill>
                   <a:srgbClr val="FFFFFF"/>
                 </a:solidFill>
-                <a:latin typeface="inherit"/>
+                <a:latin typeface="Arial" charset="0"/>
+                <a:ea typeface="Arial" charset="0"/>
+                <a:cs typeface="Arial" charset="0"/>
               </a:rPr>
               <a:t> </a:t>
             </a:r>
@@ -16094,7 +16496,9 @@
                 <a:solidFill>
                   <a:srgbClr val="FFFFFF"/>
                 </a:solidFill>
-                <a:latin typeface="inherit"/>
+                <a:latin typeface="Arial" charset="0"/>
+                <a:ea typeface="Arial" charset="0"/>
+                <a:cs typeface="Arial" charset="0"/>
               </a:rPr>
               <a:t>add</a:t>
             </a:r>
@@ -16103,7 +16507,9 @@
                 <a:solidFill>
                   <a:srgbClr val="FFFFFF"/>
                 </a:solidFill>
-                <a:latin typeface="inherit"/>
+                <a:latin typeface="Arial" charset="0"/>
+                <a:ea typeface="Arial" charset="0"/>
+                <a:cs typeface="Arial" charset="0"/>
               </a:rPr>
               <a:t> *.</a:t>
             </a:r>
@@ -16112,12 +16518,16 @@
                 <a:solidFill>
                   <a:srgbClr val="FFFFFF"/>
                 </a:solidFill>
-                <a:latin typeface="inherit"/>
+                <a:latin typeface="Arial" charset="0"/>
+                <a:ea typeface="Arial" charset="0"/>
+                <a:cs typeface="Arial" charset="0"/>
               </a:rPr>
               <a:t>txt</a:t>
             </a:r>
             <a:endParaRPr lang="de-DE" altLang="de-DE" sz="6000" dirty="0">
-              <a:latin typeface="Arial" panose="020B0604020202020204" pitchFamily="34" charset="0"/>
+              <a:latin typeface="Arial" charset="0"/>
+              <a:ea typeface="Arial" charset="0"/>
+              <a:cs typeface="Arial" charset="0"/>
             </a:endParaRPr>
           </a:p>
         </p:txBody>
@@ -16515,7 +16925,9 @@
                   <a:srgbClr val="FFFFFF"/>
                 </a:solidFill>
                 <a:effectLst/>
-                <a:latin typeface="inherit"/>
+                <a:latin typeface="Arial" charset="0"/>
+                <a:ea typeface="Arial" charset="0"/>
+                <a:cs typeface="Arial" charset="0"/>
               </a:rPr>
               <a:t> $  </a:t>
             </a:r>
@@ -16528,7 +16940,9 @@
                   <a:srgbClr val="FFFFFF"/>
                 </a:solidFill>
                 <a:effectLst/>
-                <a:latin typeface="inherit"/>
+                <a:latin typeface="Arial" charset="0"/>
+                <a:ea typeface="Arial" charset="0"/>
+                <a:cs typeface="Arial" charset="0"/>
               </a:rPr>
               <a:t>git</a:t>
             </a:r>
@@ -16541,7 +16955,9 @@
                   <a:srgbClr val="FFFFFF"/>
                 </a:solidFill>
                 <a:effectLst/>
-                <a:latin typeface="inherit"/>
+                <a:latin typeface="Arial" charset="0"/>
+                <a:ea typeface="Arial" charset="0"/>
+                <a:cs typeface="Arial" charset="0"/>
               </a:rPr>
               <a:t> </a:t>
             </a:r>
@@ -16554,7 +16970,9 @@
                   <a:srgbClr val="FFFFFF"/>
                 </a:solidFill>
                 <a:effectLst/>
-                <a:latin typeface="inherit"/>
+                <a:latin typeface="Arial" charset="0"/>
+                <a:ea typeface="Arial" charset="0"/>
+                <a:cs typeface="Arial" charset="0"/>
               </a:rPr>
               <a:t>add</a:t>
             </a:r>
@@ -16567,7 +16985,9 @@
                   <a:srgbClr val="FFFFFF"/>
                 </a:solidFill>
                 <a:effectLst/>
-                <a:latin typeface="inherit"/>
+                <a:latin typeface="Arial" charset="0"/>
+                <a:ea typeface="Arial" charset="0"/>
+                <a:cs typeface="Arial" charset="0"/>
               </a:rPr>
               <a:t> --all</a:t>
             </a:r>
@@ -16579,7 +16999,9 @@
                 <a:schemeClr val="tx1"/>
               </a:solidFill>
               <a:effectLst/>
-              <a:latin typeface="Arial" panose="020B0604020202020204" pitchFamily="34" charset="0"/>
+              <a:latin typeface="Arial" charset="0"/>
+              <a:ea typeface="Arial" charset="0"/>
+              <a:cs typeface="Arial" charset="0"/>
             </a:endParaRPr>
           </a:p>
         </p:txBody>
@@ -17071,7 +17493,9 @@
                   <a:srgbClr val="FFFFFF"/>
                 </a:solidFill>
                 <a:effectLst/>
-                <a:latin typeface="inherit"/>
+                <a:latin typeface="Arial" charset="0"/>
+                <a:ea typeface="Arial" charset="0"/>
+                <a:cs typeface="Arial" charset="0"/>
               </a:rPr>
               <a:t> $  </a:t>
             </a:r>
@@ -17084,7 +17508,9 @@
                   <a:srgbClr val="FFFFFF"/>
                 </a:solidFill>
                 <a:effectLst/>
-                <a:latin typeface="inherit"/>
+                <a:latin typeface="Arial" charset="0"/>
+                <a:ea typeface="Arial" charset="0"/>
+                <a:cs typeface="Arial" charset="0"/>
               </a:rPr>
               <a:t>git</a:t>
             </a:r>
@@ -17097,7 +17523,9 @@
                   <a:srgbClr val="FFFFFF"/>
                 </a:solidFill>
                 <a:effectLst/>
-                <a:latin typeface="inherit"/>
+                <a:latin typeface="Arial" charset="0"/>
+                <a:ea typeface="Arial" charset="0"/>
+                <a:cs typeface="Arial" charset="0"/>
               </a:rPr>
               <a:t> </a:t>
             </a:r>
@@ -17110,7 +17538,9 @@
                   <a:srgbClr val="FFFFFF"/>
                 </a:solidFill>
                 <a:effectLst/>
-                <a:latin typeface="inherit"/>
+                <a:latin typeface="Arial" charset="0"/>
+                <a:ea typeface="Arial" charset="0"/>
+                <a:cs typeface="Arial" charset="0"/>
               </a:rPr>
               <a:t>commit</a:t>
             </a:r>
@@ -17123,7 +17553,9 @@
                   <a:srgbClr val="FFFFFF"/>
                 </a:solidFill>
                 <a:effectLst/>
-                <a:latin typeface="inherit"/>
+                <a:latin typeface="Arial" charset="0"/>
+                <a:ea typeface="Arial" charset="0"/>
+                <a:cs typeface="Arial" charset="0"/>
               </a:rPr>
               <a:t> -m „</a:t>
             </a:r>
@@ -17136,7 +17568,9 @@
                   <a:srgbClr val="FFFFFF"/>
                 </a:solidFill>
                 <a:effectLst/>
-                <a:latin typeface="inherit"/>
+                <a:latin typeface="Arial" charset="0"/>
+                <a:ea typeface="Arial" charset="0"/>
+                <a:cs typeface="Arial" charset="0"/>
               </a:rPr>
               <a:t>first</a:t>
             </a:r>
@@ -17149,7 +17583,9 @@
                   <a:srgbClr val="FFFFFF"/>
                 </a:solidFill>
                 <a:effectLst/>
-                <a:latin typeface="inherit"/>
+                <a:latin typeface="Arial" charset="0"/>
+                <a:ea typeface="Arial" charset="0"/>
+                <a:cs typeface="Arial" charset="0"/>
               </a:rPr>
               <a:t> </a:t>
             </a:r>
@@ -17162,7 +17598,9 @@
                   <a:srgbClr val="FFFFFF"/>
                 </a:solidFill>
                 <a:effectLst/>
-                <a:latin typeface="inherit"/>
+                <a:latin typeface="Arial" charset="0"/>
+                <a:ea typeface="Arial" charset="0"/>
+                <a:cs typeface="Arial" charset="0"/>
               </a:rPr>
               <a:t>commit</a:t>
             </a:r>
@@ -17175,7 +17613,9 @@
                   <a:srgbClr val="FFFFFF"/>
                 </a:solidFill>
                 <a:effectLst/>
-                <a:latin typeface="inherit"/>
+                <a:latin typeface="Arial" charset="0"/>
+                <a:ea typeface="Arial" charset="0"/>
+                <a:cs typeface="Arial" charset="0"/>
               </a:rPr>
               <a:t>“</a:t>
             </a:r>
@@ -17187,7 +17627,9 @@
                 <a:schemeClr val="tx1"/>
               </a:solidFill>
               <a:effectLst/>
-              <a:latin typeface="Arial" panose="020B0604020202020204" pitchFamily="34" charset="0"/>
+              <a:latin typeface="Arial" charset="0"/>
+              <a:ea typeface="Arial" charset="0"/>
+              <a:cs typeface="Arial" charset="0"/>
             </a:endParaRPr>
           </a:p>
         </p:txBody>
@@ -17585,7 +18027,9 @@
                   <a:srgbClr val="FFFFFF"/>
                 </a:solidFill>
                 <a:effectLst/>
-                <a:latin typeface="inherit"/>
+                <a:latin typeface="Arial" charset="0"/>
+                <a:ea typeface="Arial" charset="0"/>
+                <a:cs typeface="Arial" charset="0"/>
               </a:rPr>
               <a:t> $  </a:t>
             </a:r>
@@ -17598,7 +18042,9 @@
                   <a:srgbClr val="FFFFFF"/>
                 </a:solidFill>
                 <a:effectLst/>
-                <a:latin typeface="inherit"/>
+                <a:latin typeface="Arial" charset="0"/>
+                <a:ea typeface="Arial" charset="0"/>
+                <a:cs typeface="Arial" charset="0"/>
               </a:rPr>
               <a:t>git</a:t>
             </a:r>
@@ -17611,7 +18057,9 @@
                   <a:srgbClr val="FFFFFF"/>
                 </a:solidFill>
                 <a:effectLst/>
-                <a:latin typeface="inherit"/>
+                <a:latin typeface="Arial" charset="0"/>
+                <a:ea typeface="Arial" charset="0"/>
+                <a:cs typeface="Arial" charset="0"/>
               </a:rPr>
               <a:t> </a:t>
             </a:r>
@@ -17624,7 +18072,9 @@
                   <a:srgbClr val="FFFFFF"/>
                 </a:solidFill>
                 <a:effectLst/>
-                <a:latin typeface="inherit"/>
+                <a:latin typeface="Arial" charset="0"/>
+                <a:ea typeface="Arial" charset="0"/>
+                <a:cs typeface="Arial" charset="0"/>
               </a:rPr>
               <a:t>commit</a:t>
             </a:r>
@@ -17637,7 +18087,9 @@
                   <a:srgbClr val="FFFFFF"/>
                 </a:solidFill>
                 <a:effectLst/>
-                <a:latin typeface="inherit"/>
+                <a:latin typeface="Arial" charset="0"/>
+                <a:ea typeface="Arial" charset="0"/>
+                <a:cs typeface="Arial" charset="0"/>
               </a:rPr>
               <a:t> -a -m „</a:t>
             </a:r>
@@ -17650,7 +18102,9 @@
                   <a:srgbClr val="FFFFFF"/>
                 </a:solidFill>
                 <a:effectLst/>
-                <a:latin typeface="inherit"/>
+                <a:latin typeface="Arial" charset="0"/>
+                <a:ea typeface="Arial" charset="0"/>
+                <a:cs typeface="Arial" charset="0"/>
               </a:rPr>
               <a:t>first</a:t>
             </a:r>
@@ -17663,7 +18117,9 @@
                   <a:srgbClr val="FFFFFF"/>
                 </a:solidFill>
                 <a:effectLst/>
-                <a:latin typeface="inherit"/>
+                <a:latin typeface="Arial" charset="0"/>
+                <a:ea typeface="Arial" charset="0"/>
+                <a:cs typeface="Arial" charset="0"/>
               </a:rPr>
               <a:t> </a:t>
             </a:r>
@@ -17676,7 +18132,9 @@
                   <a:srgbClr val="FFFFFF"/>
                 </a:solidFill>
                 <a:effectLst/>
-                <a:latin typeface="inherit"/>
+                <a:latin typeface="Arial" charset="0"/>
+                <a:ea typeface="Arial" charset="0"/>
+                <a:cs typeface="Arial" charset="0"/>
               </a:rPr>
               <a:t>commit</a:t>
             </a:r>
@@ -17689,7 +18147,9 @@
                   <a:srgbClr val="FFFFFF"/>
                 </a:solidFill>
                 <a:effectLst/>
-                <a:latin typeface="inherit"/>
+                <a:latin typeface="Arial" charset="0"/>
+                <a:ea typeface="Arial" charset="0"/>
+                <a:cs typeface="Arial" charset="0"/>
               </a:rPr>
               <a:t>“</a:t>
             </a:r>
@@ -17701,7 +18161,9 @@
                 <a:schemeClr val="tx1"/>
               </a:solidFill>
               <a:effectLst/>
-              <a:latin typeface="Arial" panose="020B0604020202020204" pitchFamily="34" charset="0"/>
+              <a:latin typeface="Arial" charset="0"/>
+              <a:ea typeface="Arial" charset="0"/>
+              <a:cs typeface="Arial" charset="0"/>
             </a:endParaRPr>
           </a:p>
         </p:txBody>

</xml_diff>